<commit_message>
Fix logo display on dark background - add white card container
</commit_message>
<xml_diff>
--- a/MEDD-SIM-Pitch-Deck.pptx
+++ b/MEDD-SIM-Pitch-Deck.pptx
@@ -3092,7 +3092,7 @@
     <p:bg>
       <p:bgPr>
         <a:solidFill>
-          <a:srgbClr val="C7F464"/>
+          <a:srgbClr val="1A1A1A"/>
         </a:solidFill>
         <a:effectLst/>
       </p:bgPr>
@@ -3112,7 +3112,7 @@
         </p:nvSpPr>
         <p:spPr>
           <a:xfrm>
-            <a:off x="0" y="2286000"/>
+            <a:off x="0" y="2011680"/>
             <a:ext cx="12191695" cy="914400"/>
           </a:xfrm>
           <a:prstGeom prst="rect">
@@ -3127,9 +3127,9 @@
           <a:lstStyle/>
           <a:p>
             <a:pPr algn="ctr">
-              <a:defRPr sz="7200" b="1">
-                <a:solidFill>
-                  <a:srgbClr val="0D6B56"/>
+              <a:defRPr sz="6400" b="1">
+                <a:solidFill>
+                  <a:srgbClr val="10A37F"/>
                 </a:solidFill>
                 <a:latin typeface="Arial"/>
               </a:defRPr>
@@ -3148,7 +3148,7 @@
         </p:nvSpPr>
         <p:spPr>
           <a:xfrm>
-            <a:off x="1371600" y="4114800"/>
+            <a:off x="1371600" y="3657600"/>
             <a:ext cx="9448495" cy="1371600"/>
           </a:xfrm>
           <a:prstGeom prst="rect">
@@ -3163,19 +3163,19 @@
           <a:lstStyle/>
           <a:p>
             <a:pPr algn="ctr">
-              <a:defRPr sz="2400" b="0">
-                <a:solidFill>
-                  <a:srgbClr val="1A1A1A"/>
-                </a:solidFill>
-                <a:latin typeface="Arial"/>
-              </a:defRPr>
-            </a:pPr>
-            <a:r>
-              <a:t>Giving your team the tools to practice the moments that matter,</a:t>
+              <a:defRPr sz="2600" b="0">
+                <a:solidFill>
+                  <a:srgbClr val="FFFFFF"/>
+                </a:solidFill>
+                <a:latin typeface="Arial"/>
+              </a:defRPr>
+            </a:pPr>
+            <a:r>
+              <a:t>Giving your team the tools to practice</a:t>
             </a:r>
             <a:br/>
             <a:r>
-              <a:t>before they matter.</a:t>
+              <a:t>the moments that matter, before they matter.</a:t>
             </a:r>
           </a:p>
         </p:txBody>
@@ -3194,7 +3194,7 @@
     <p:bg>
       <p:bgPr>
         <a:solidFill>
-          <a:srgbClr val="C7F464"/>
+          <a:srgbClr val="1A1A1A"/>
         </a:solidFill>
         <a:effectLst/>
       </p:bgPr>
@@ -3214,84 +3214,8 @@
         </p:nvSpPr>
         <p:spPr>
           <a:xfrm>
-            <a:off x="914400" y="914400"/>
-            <a:ext cx="5486400" cy="457200"/>
-          </a:xfrm>
-          <a:prstGeom prst="rect">
-            <a:avLst/>
-          </a:prstGeom>
-          <a:noFill/>
-        </p:spPr>
-        <p:txBody>
-          <a:bodyPr wrap="square">
-            <a:spAutoFit/>
-          </a:bodyPr>
-          <a:lstStyle/>
-          <a:p>
-            <a:pPr>
-              <a:defRPr sz="1800" b="0">
-                <a:solidFill>
-                  <a:srgbClr val="4A4A4A"/>
-                </a:solidFill>
-                <a:latin typeface="Arial"/>
-              </a:defRPr>
-            </a:pPr>
-            <a:r>
-              <a:t>Our Vision</a:t>
-            </a:r>
-          </a:p>
-        </p:txBody>
-      </p:sp>
-      <p:sp>
-        <p:nvSpPr>
-          <p:cNvPr id="3" name="TextBox 2"/>
-          <p:cNvSpPr txBox="1"/>
-          <p:nvPr/>
-        </p:nvSpPr>
-        <p:spPr>
-          <a:xfrm>
-            <a:off x="914400" y="1371600"/>
-            <a:ext cx="5486400" cy="1371600"/>
-          </a:xfrm>
-          <a:prstGeom prst="rect">
-            <a:avLst/>
-          </a:prstGeom>
-          <a:noFill/>
-        </p:spPr>
-        <p:txBody>
-          <a:bodyPr wrap="square">
-            <a:spAutoFit/>
-          </a:bodyPr>
-          <a:lstStyle/>
-          <a:p>
-            <a:pPr>
-              <a:defRPr sz="4000" b="1">
-                <a:solidFill>
-                  <a:srgbClr val="1A1A1A"/>
-                </a:solidFill>
-                <a:latin typeface="Arial"/>
-              </a:defRPr>
-            </a:pPr>
-            <a:r>
-              <a:t>Make deliberate practice</a:t>
-            </a:r>
-            <a:br/>
-            <a:r>
-              <a:t>a daily norm.</a:t>
-            </a:r>
-          </a:p>
-        </p:txBody>
-      </p:sp>
-      <p:sp>
-        <p:nvSpPr>
-          <p:cNvPr id="4" name="TextBox 3"/>
-          <p:cNvSpPr txBox="1"/>
-          <p:nvPr/>
-        </p:nvSpPr>
-        <p:spPr>
-          <a:xfrm>
-            <a:off x="914400" y="3200400"/>
-            <a:ext cx="5029200" cy="1371600"/>
+            <a:off x="731520" y="731520"/>
+            <a:ext cx="5486400" cy="365760"/>
           </a:xfrm>
           <a:prstGeom prst="rect">
             <a:avLst/>
@@ -3307,7 +3231,83 @@
             <a:pPr>
               <a:defRPr sz="1600" b="0">
                 <a:solidFill>
-                  <a:srgbClr val="4A4A4A"/>
+                  <a:srgbClr val="10A37F"/>
+                </a:solidFill>
+                <a:latin typeface="Arial"/>
+              </a:defRPr>
+            </a:pPr>
+            <a:r>
+              <a:t>Our Vision</a:t>
+            </a:r>
+          </a:p>
+        </p:txBody>
+      </p:sp>
+      <p:sp>
+        <p:nvSpPr>
+          <p:cNvPr id="3" name="TextBox 2"/>
+          <p:cNvSpPr txBox="1"/>
+          <p:nvPr/>
+        </p:nvSpPr>
+        <p:spPr>
+          <a:xfrm>
+            <a:off x="731520" y="1188720"/>
+            <a:ext cx="5486400" cy="1097280"/>
+          </a:xfrm>
+          <a:prstGeom prst="rect">
+            <a:avLst/>
+          </a:prstGeom>
+          <a:noFill/>
+        </p:spPr>
+        <p:txBody>
+          <a:bodyPr wrap="square">
+            <a:spAutoFit/>
+          </a:bodyPr>
+          <a:lstStyle/>
+          <a:p>
+            <a:pPr>
+              <a:defRPr sz="3600" b="1">
+                <a:solidFill>
+                  <a:srgbClr val="FFFFFF"/>
+                </a:solidFill>
+                <a:latin typeface="Arial"/>
+              </a:defRPr>
+            </a:pPr>
+            <a:r>
+              <a:t>Make deliberate practice</a:t>
+            </a:r>
+            <a:br/>
+            <a:r>
+              <a:t>a daily norm.</a:t>
+            </a:r>
+          </a:p>
+        </p:txBody>
+      </p:sp>
+      <p:sp>
+        <p:nvSpPr>
+          <p:cNvPr id="4" name="TextBox 3"/>
+          <p:cNvSpPr txBox="1"/>
+          <p:nvPr/>
+        </p:nvSpPr>
+        <p:spPr>
+          <a:xfrm>
+            <a:off x="731520" y="2743200"/>
+            <a:ext cx="5029200" cy="1097280"/>
+          </a:xfrm>
+          <a:prstGeom prst="rect">
+            <a:avLst/>
+          </a:prstGeom>
+          <a:noFill/>
+        </p:spPr>
+        <p:txBody>
+          <a:bodyPr wrap="square">
+            <a:spAutoFit/>
+          </a:bodyPr>
+          <a:lstStyle/>
+          <a:p>
+            <a:pPr>
+              <a:defRPr sz="1400" b="0">
+                <a:solidFill>
+                  <a:srgbClr val="A0A0A0"/>
                 </a:solidFill>
                 <a:latin typeface="Arial"/>
               </a:defRPr>
@@ -3318,6 +3318,229 @@
             <a:br/>
             <a:r>
               <a:t>Build any AI-powered coach, role-play, or examiner in minutes.</a:t>
+            </a:r>
+          </a:p>
+        </p:txBody>
+      </p:sp>
+      <p:sp>
+        <p:nvSpPr>
+          <p:cNvPr id="5" name="TextBox 4"/>
+          <p:cNvSpPr txBox="1"/>
+          <p:nvPr/>
+        </p:nvSpPr>
+        <p:spPr>
+          <a:xfrm>
+            <a:off x="731520" y="4114800"/>
+            <a:ext cx="1828800" cy="731520"/>
+          </a:xfrm>
+          <a:prstGeom prst="rect">
+            <a:avLst/>
+          </a:prstGeom>
+          <a:noFill/>
+        </p:spPr>
+        <p:txBody>
+          <a:bodyPr wrap="square">
+            <a:spAutoFit/>
+          </a:bodyPr>
+          <a:lstStyle/>
+          <a:p>
+            <a:pPr>
+              <a:defRPr sz="4400" b="1">
+                <a:solidFill>
+                  <a:srgbClr val="10A37F"/>
+                </a:solidFill>
+                <a:latin typeface="Arial"/>
+              </a:defRPr>
+            </a:pPr>
+            <a:r>
+              <a:t>73%</a:t>
+            </a:r>
+          </a:p>
+        </p:txBody>
+      </p:sp>
+      <p:sp>
+        <p:nvSpPr>
+          <p:cNvPr id="6" name="TextBox 5"/>
+          <p:cNvSpPr txBox="1"/>
+          <p:nvPr/>
+        </p:nvSpPr>
+        <p:spPr>
+          <a:xfrm>
+            <a:off x="731520" y="4846320"/>
+            <a:ext cx="1828800" cy="365760"/>
+          </a:xfrm>
+          <a:prstGeom prst="rect">
+            <a:avLst/>
+          </a:prstGeom>
+          <a:noFill/>
+        </p:spPr>
+        <p:txBody>
+          <a:bodyPr wrap="square">
+            <a:spAutoFit/>
+          </a:bodyPr>
+          <a:lstStyle/>
+          <a:p>
+            <a:pPr algn="ctr">
+              <a:defRPr sz="1200" b="0">
+                <a:solidFill>
+                  <a:srgbClr val="A0A0A0"/>
+                </a:solidFill>
+                <a:latin typeface="Arial"/>
+              </a:defRPr>
+            </a:pPr>
+            <a:r>
+              <a:t>avoid role-play</a:t>
+            </a:r>
+          </a:p>
+        </p:txBody>
+      </p:sp>
+      <p:sp>
+        <p:nvSpPr>
+          <p:cNvPr id="7" name="TextBox 6"/>
+          <p:cNvSpPr txBox="1"/>
+          <p:nvPr/>
+        </p:nvSpPr>
+        <p:spPr>
+          <a:xfrm>
+            <a:off x="3200400" y="4114800"/>
+            <a:ext cx="1828800" cy="731520"/>
+          </a:xfrm>
+          <a:prstGeom prst="rect">
+            <a:avLst/>
+          </a:prstGeom>
+          <a:noFill/>
+        </p:spPr>
+        <p:txBody>
+          <a:bodyPr wrap="square">
+            <a:spAutoFit/>
+          </a:bodyPr>
+          <a:lstStyle/>
+          <a:p>
+            <a:pPr>
+              <a:defRPr sz="4400" b="1">
+                <a:solidFill>
+                  <a:srgbClr val="10A37F"/>
+                </a:solidFill>
+                <a:latin typeface="Arial"/>
+              </a:defRPr>
+            </a:pPr>
+            <a:r>
+              <a:t>4x</a:t>
+            </a:r>
+          </a:p>
+        </p:txBody>
+      </p:sp>
+      <p:sp>
+        <p:nvSpPr>
+          <p:cNvPr id="8" name="TextBox 7"/>
+          <p:cNvSpPr txBox="1"/>
+          <p:nvPr/>
+        </p:nvSpPr>
+        <p:spPr>
+          <a:xfrm>
+            <a:off x="3200400" y="4846320"/>
+            <a:ext cx="1828800" cy="365760"/>
+          </a:xfrm>
+          <a:prstGeom prst="rect">
+            <a:avLst/>
+          </a:prstGeom>
+          <a:noFill/>
+        </p:spPr>
+        <p:txBody>
+          <a:bodyPr wrap="square">
+            <a:spAutoFit/>
+          </a:bodyPr>
+          <a:lstStyle/>
+          <a:p>
+            <a:pPr algn="ctr">
+              <a:defRPr sz="1200" b="0">
+                <a:solidFill>
+                  <a:srgbClr val="A0A0A0"/>
+                </a:solidFill>
+                <a:latin typeface="Arial"/>
+              </a:defRPr>
+            </a:pPr>
+            <a:r>
+              <a:t>faster learning</a:t>
+            </a:r>
+          </a:p>
+        </p:txBody>
+      </p:sp>
+      <p:sp>
+        <p:nvSpPr>
+          <p:cNvPr id="9" name="Rounded Rectangle 8"/>
+          <p:cNvSpPr/>
+          <p:nvPr/>
+        </p:nvSpPr>
+        <p:spPr>
+          <a:xfrm>
+            <a:off x="6400800" y="1371600"/>
+            <a:ext cx="5029200" cy="4114800"/>
+          </a:xfrm>
+          <a:prstGeom prst="roundRect">
+            <a:avLst/>
+          </a:prstGeom>
+          <a:solidFill>
+            <a:srgbClr val="2A2A2A"/>
+          </a:solidFill>
+          <a:ln>
+            <a:noFill/>
+          </a:ln>
+        </p:spPr>
+        <p:style>
+          <a:lnRef idx="1">
+            <a:schemeClr val="accent1"/>
+          </a:lnRef>
+          <a:fillRef idx="3">
+            <a:schemeClr val="accent1"/>
+          </a:fillRef>
+          <a:effectRef idx="2">
+            <a:schemeClr val="accent1"/>
+          </a:effectRef>
+          <a:fontRef idx="minor">
+            <a:schemeClr val="lt1"/>
+          </a:fontRef>
+        </p:style>
+        <p:txBody>
+          <a:bodyPr rtlCol="0" anchor="ctr"/>
+          <a:lstStyle/>
+          <a:p>
+            <a:pPr algn="ctr"/>
+          </a:p>
+        </p:txBody>
+      </p:sp>
+      <p:sp>
+        <p:nvSpPr>
+          <p:cNvPr id="10" name="TextBox 9"/>
+          <p:cNvSpPr txBox="1"/>
+          <p:nvPr/>
+        </p:nvSpPr>
+        <p:spPr>
+          <a:xfrm>
+            <a:off x="6858000" y="3200400"/>
+            <a:ext cx="4114800" cy="457200"/>
+          </a:xfrm>
+          <a:prstGeom prst="rect">
+            <a:avLst/>
+          </a:prstGeom>
+          <a:noFill/>
+        </p:spPr>
+        <p:txBody>
+          <a:bodyPr wrap="square">
+            <a:spAutoFit/>
+          </a:bodyPr>
+          <a:lstStyle/>
+          <a:p>
+            <a:pPr algn="ctr">
+              <a:defRPr sz="1400" b="0">
+                <a:solidFill>
+                  <a:srgbClr val="A0A0A0"/>
+                </a:solidFill>
+                <a:latin typeface="Arial"/>
+              </a:defRPr>
+            </a:pPr>
+            <a:r>
+              <a:t>📸 Team Collaboration Image</a:t>
             </a:r>
           </a:p>
         </p:txBody>
@@ -3356,8 +3579,8 @@
         </p:nvSpPr>
         <p:spPr>
           <a:xfrm>
-            <a:off x="914400" y="457200"/>
-            <a:ext cx="10058400" cy="731520"/>
+            <a:off x="731520" y="457200"/>
+            <a:ext cx="10058400" cy="640080"/>
           </a:xfrm>
           <a:prstGeom prst="rect">
             <a:avLst/>
@@ -3371,7 +3594,7 @@
           <a:lstStyle/>
           <a:p>
             <a:pPr>
-              <a:defRPr sz="3600" b="1">
+              <a:defRPr sz="3200" b="1">
                 <a:solidFill>
                   <a:srgbClr val="FFFFFF"/>
                 </a:solidFill>
@@ -3392,14 +3615,14 @@
         </p:nvSpPr>
         <p:spPr>
           <a:xfrm>
-            <a:off x="731520" y="2286000"/>
-            <a:ext cx="3474720" cy="2011680"/>
+            <a:off x="731520" y="1828800"/>
+            <a:ext cx="3474720" cy="3657600"/>
           </a:xfrm>
           <a:prstGeom prst="roundRect">
             <a:avLst/>
           </a:prstGeom>
           <a:solidFill>
-            <a:srgbClr val="FFFFFF"/>
+            <a:srgbClr val="2A2A2A"/>
           </a:solidFill>
           <a:ln>
             <a:noFill/>
@@ -3435,8 +3658,44 @@
         </p:nvSpPr>
         <p:spPr>
           <a:xfrm>
-            <a:off x="914400" y="2468880"/>
-            <a:ext cx="3108960" cy="457200"/>
+            <a:off x="2103120" y="2103120"/>
+            <a:ext cx="914400" cy="914400"/>
+          </a:xfrm>
+          <a:prstGeom prst="rect">
+            <a:avLst/>
+          </a:prstGeom>
+          <a:noFill/>
+        </p:spPr>
+        <p:txBody>
+          <a:bodyPr wrap="square">
+            <a:spAutoFit/>
+          </a:bodyPr>
+          <a:lstStyle/>
+          <a:p>
+            <a:pPr algn="ctr">
+              <a:defRPr sz="4800" b="0">
+                <a:solidFill>
+                  <a:srgbClr val="A0A0A0"/>
+                </a:solidFill>
+                <a:latin typeface="Arial"/>
+              </a:defRPr>
+            </a:pPr>
+            <a:r>
+              <a:t>📸</a:t>
+            </a:r>
+          </a:p>
+        </p:txBody>
+      </p:sp>
+      <p:sp>
+        <p:nvSpPr>
+          <p:cNvPr id="5" name="TextBox 4"/>
+          <p:cNvSpPr txBox="1"/>
+          <p:nvPr/>
+        </p:nvSpPr>
+        <p:spPr>
+          <a:xfrm>
+            <a:off x="1005840" y="3657600"/>
+            <a:ext cx="2926080" cy="457200"/>
           </a:xfrm>
           <a:prstGeom prst="rect">
             <a:avLst/>
@@ -3452,7 +3711,7 @@
             <a:pPr>
               <a:defRPr sz="1400" b="1">
                 <a:solidFill>
-                  <a:srgbClr val="0D6B56"/>
+                  <a:srgbClr val="FFFFFF"/>
                 </a:solidFill>
                 <a:latin typeface="Arial"/>
               </a:defRPr>
@@ -3465,14 +3724,14 @@
       </p:sp>
       <p:sp>
         <p:nvSpPr>
-          <p:cNvPr id="5" name="TextBox 4"/>
-          <p:cNvSpPr txBox="1"/>
-          <p:nvPr/>
-        </p:nvSpPr>
-        <p:spPr>
-          <a:xfrm>
-            <a:off x="914400" y="2834640"/>
-            <a:ext cx="3108960" cy="1097280"/>
+          <p:cNvPr id="6" name="TextBox 5"/>
+          <p:cNvSpPr txBox="1"/>
+          <p:nvPr/>
+        </p:nvSpPr>
+        <p:spPr>
+          <a:xfrm>
+            <a:off x="1005840" y="4206240"/>
+            <a:ext cx="2926080" cy="1097280"/>
           </a:xfrm>
           <a:prstGeom prst="rect">
             <a:avLst/>
@@ -3488,7 +3747,7 @@
             <a:pPr>
               <a:defRPr sz="1100" b="0">
                 <a:solidFill>
-                  <a:srgbClr val="4A4A4A"/>
+                  <a:srgbClr val="A0A0A0"/>
                 </a:solidFill>
                 <a:latin typeface="Arial"/>
               </a:defRPr>
@@ -3501,20 +3760,20 @@
       </p:sp>
       <p:sp>
         <p:nvSpPr>
-          <p:cNvPr id="6" name="Rounded Rectangle 5"/>
+          <p:cNvPr id="7" name="Rounded Rectangle 6"/>
           <p:cNvSpPr/>
           <p:nvPr/>
         </p:nvSpPr>
         <p:spPr>
           <a:xfrm>
-            <a:off x="4389120" y="2286000"/>
-            <a:ext cx="3474720" cy="2011680"/>
+            <a:off x="4389120" y="1828800"/>
+            <a:ext cx="3474720" cy="3657600"/>
           </a:xfrm>
           <a:prstGeom prst="roundRect">
             <a:avLst/>
           </a:prstGeom>
           <a:solidFill>
-            <a:srgbClr val="FFFFFF"/>
+            <a:srgbClr val="2A2A2A"/>
           </a:solidFill>
           <a:ln>
             <a:noFill/>
@@ -3544,14 +3803,50 @@
       </p:sp>
       <p:sp>
         <p:nvSpPr>
-          <p:cNvPr id="7" name="TextBox 6"/>
-          <p:cNvSpPr txBox="1"/>
-          <p:nvPr/>
-        </p:nvSpPr>
-        <p:spPr>
-          <a:xfrm>
-            <a:off x="4572000" y="2468880"/>
-            <a:ext cx="3108960" cy="457200"/>
+          <p:cNvPr id="8" name="TextBox 7"/>
+          <p:cNvSpPr txBox="1"/>
+          <p:nvPr/>
+        </p:nvSpPr>
+        <p:spPr>
+          <a:xfrm>
+            <a:off x="5760720" y="2103120"/>
+            <a:ext cx="914400" cy="914400"/>
+          </a:xfrm>
+          <a:prstGeom prst="rect">
+            <a:avLst/>
+          </a:prstGeom>
+          <a:noFill/>
+        </p:spPr>
+        <p:txBody>
+          <a:bodyPr wrap="square">
+            <a:spAutoFit/>
+          </a:bodyPr>
+          <a:lstStyle/>
+          <a:p>
+            <a:pPr algn="ctr">
+              <a:defRPr sz="4800" b="0">
+                <a:solidFill>
+                  <a:srgbClr val="A0A0A0"/>
+                </a:solidFill>
+                <a:latin typeface="Arial"/>
+              </a:defRPr>
+            </a:pPr>
+            <a:r>
+              <a:t>📸</a:t>
+            </a:r>
+          </a:p>
+        </p:txBody>
+      </p:sp>
+      <p:sp>
+        <p:nvSpPr>
+          <p:cNvPr id="9" name="TextBox 8"/>
+          <p:cNvSpPr txBox="1"/>
+          <p:nvPr/>
+        </p:nvSpPr>
+        <p:spPr>
+          <a:xfrm>
+            <a:off x="4663440" y="3657600"/>
+            <a:ext cx="2926080" cy="457200"/>
           </a:xfrm>
           <a:prstGeom prst="rect">
             <a:avLst/>
@@ -3567,7 +3862,7 @@
             <a:pPr>
               <a:defRPr sz="1400" b="1">
                 <a:solidFill>
-                  <a:srgbClr val="0D6B56"/>
+                  <a:srgbClr val="FFFFFF"/>
                 </a:solidFill>
                 <a:latin typeface="Arial"/>
               </a:defRPr>
@@ -3580,14 +3875,14 @@
       </p:sp>
       <p:sp>
         <p:nvSpPr>
-          <p:cNvPr id="8" name="TextBox 7"/>
-          <p:cNvSpPr txBox="1"/>
-          <p:nvPr/>
-        </p:nvSpPr>
-        <p:spPr>
-          <a:xfrm>
-            <a:off x="4572000" y="2834640"/>
-            <a:ext cx="3108960" cy="1097280"/>
+          <p:cNvPr id="10" name="TextBox 9"/>
+          <p:cNvSpPr txBox="1"/>
+          <p:nvPr/>
+        </p:nvSpPr>
+        <p:spPr>
+          <a:xfrm>
+            <a:off x="4663440" y="4206240"/>
+            <a:ext cx="2926080" cy="1097280"/>
           </a:xfrm>
           <a:prstGeom prst="rect">
             <a:avLst/>
@@ -3603,7 +3898,7 @@
             <a:pPr>
               <a:defRPr sz="1100" b="0">
                 <a:solidFill>
-                  <a:srgbClr val="4A4A4A"/>
+                  <a:srgbClr val="A0A0A0"/>
                 </a:solidFill>
                 <a:latin typeface="Arial"/>
               </a:defRPr>
@@ -3616,20 +3911,20 @@
       </p:sp>
       <p:sp>
         <p:nvSpPr>
-          <p:cNvPr id="9" name="Rounded Rectangle 8"/>
+          <p:cNvPr id="11" name="Rounded Rectangle 10"/>
           <p:cNvSpPr/>
           <p:nvPr/>
         </p:nvSpPr>
         <p:spPr>
           <a:xfrm>
-            <a:off x="8046720" y="2286000"/>
-            <a:ext cx="3474720" cy="2011680"/>
+            <a:off x="8046720" y="1828800"/>
+            <a:ext cx="3474720" cy="3657600"/>
           </a:xfrm>
           <a:prstGeom prst="roundRect">
             <a:avLst/>
           </a:prstGeom>
           <a:solidFill>
-            <a:srgbClr val="FFFFFF"/>
+            <a:srgbClr val="2A2A2A"/>
           </a:solidFill>
           <a:ln>
             <a:noFill/>
@@ -3659,14 +3954,50 @@
       </p:sp>
       <p:sp>
         <p:nvSpPr>
-          <p:cNvPr id="10" name="TextBox 9"/>
-          <p:cNvSpPr txBox="1"/>
-          <p:nvPr/>
-        </p:nvSpPr>
-        <p:spPr>
-          <a:xfrm>
-            <a:off x="8229600" y="2468880"/>
-            <a:ext cx="3108960" cy="457200"/>
+          <p:cNvPr id="12" name="TextBox 11"/>
+          <p:cNvSpPr txBox="1"/>
+          <p:nvPr/>
+        </p:nvSpPr>
+        <p:spPr>
+          <a:xfrm>
+            <a:off x="9418320" y="2103120"/>
+            <a:ext cx="914400" cy="914400"/>
+          </a:xfrm>
+          <a:prstGeom prst="rect">
+            <a:avLst/>
+          </a:prstGeom>
+          <a:noFill/>
+        </p:spPr>
+        <p:txBody>
+          <a:bodyPr wrap="square">
+            <a:spAutoFit/>
+          </a:bodyPr>
+          <a:lstStyle/>
+          <a:p>
+            <a:pPr algn="ctr">
+              <a:defRPr sz="4800" b="0">
+                <a:solidFill>
+                  <a:srgbClr val="A0A0A0"/>
+                </a:solidFill>
+                <a:latin typeface="Arial"/>
+              </a:defRPr>
+            </a:pPr>
+            <a:r>
+              <a:t>📸</a:t>
+            </a:r>
+          </a:p>
+        </p:txBody>
+      </p:sp>
+      <p:sp>
+        <p:nvSpPr>
+          <p:cNvPr id="13" name="TextBox 12"/>
+          <p:cNvSpPr txBox="1"/>
+          <p:nvPr/>
+        </p:nvSpPr>
+        <p:spPr>
+          <a:xfrm>
+            <a:off x="8321040" y="3657600"/>
+            <a:ext cx="2926080" cy="457200"/>
           </a:xfrm>
           <a:prstGeom prst="rect">
             <a:avLst/>
@@ -3682,7 +4013,7 @@
             <a:pPr>
               <a:defRPr sz="1400" b="1">
                 <a:solidFill>
-                  <a:srgbClr val="0D6B56"/>
+                  <a:srgbClr val="FFFFFF"/>
                 </a:solidFill>
                 <a:latin typeface="Arial"/>
               </a:defRPr>
@@ -3695,14 +4026,14 @@
       </p:sp>
       <p:sp>
         <p:nvSpPr>
-          <p:cNvPr id="11" name="TextBox 10"/>
-          <p:cNvSpPr txBox="1"/>
-          <p:nvPr/>
-        </p:nvSpPr>
-        <p:spPr>
-          <a:xfrm>
-            <a:off x="8229600" y="2834640"/>
-            <a:ext cx="3108960" cy="1097280"/>
+          <p:cNvPr id="14" name="TextBox 13"/>
+          <p:cNvSpPr txBox="1"/>
+          <p:nvPr/>
+        </p:nvSpPr>
+        <p:spPr>
+          <a:xfrm>
+            <a:off x="8321040" y="4206240"/>
+            <a:ext cx="2926080" cy="1097280"/>
           </a:xfrm>
           <a:prstGeom prst="rect">
             <a:avLst/>
@@ -3718,7 +4049,7 @@
             <a:pPr>
               <a:defRPr sz="1100" b="0">
                 <a:solidFill>
-                  <a:srgbClr val="4A4A4A"/>
+                  <a:srgbClr val="A0A0A0"/>
                 </a:solidFill>
                 <a:latin typeface="Arial"/>
               </a:defRPr>
@@ -3743,7 +4074,7 @@
     <p:bg>
       <p:bgPr>
         <a:solidFill>
-          <a:srgbClr val="C7F464"/>
+          <a:srgbClr val="1A1A1A"/>
         </a:solidFill>
         <a:effectLst/>
       </p:bgPr>
@@ -3763,80 +4094,8 @@
         </p:nvSpPr>
         <p:spPr>
           <a:xfrm>
-            <a:off x="914400" y="457200"/>
-            <a:ext cx="5486400" cy="457200"/>
-          </a:xfrm>
-          <a:prstGeom prst="rect">
-            <a:avLst/>
-          </a:prstGeom>
-          <a:noFill/>
-        </p:spPr>
-        <p:txBody>
-          <a:bodyPr wrap="square">
-            <a:spAutoFit/>
-          </a:bodyPr>
-          <a:lstStyle/>
-          <a:p>
-            <a:pPr>
-              <a:defRPr sz="1800" b="0">
-                <a:solidFill>
-                  <a:srgbClr val="4A4A4A"/>
-                </a:solidFill>
-                <a:latin typeface="Arial"/>
-              </a:defRPr>
-            </a:pPr>
-            <a:r>
-              <a:t>How we fix it</a:t>
-            </a:r>
-          </a:p>
-        </p:txBody>
-      </p:sp>
-      <p:sp>
-        <p:nvSpPr>
-          <p:cNvPr id="3" name="TextBox 2"/>
-          <p:cNvSpPr txBox="1"/>
-          <p:nvPr/>
-        </p:nvSpPr>
-        <p:spPr>
-          <a:xfrm>
-            <a:off x="914400" y="914400"/>
-            <a:ext cx="5486400" cy="731520"/>
-          </a:xfrm>
-          <a:prstGeom prst="rect">
-            <a:avLst/>
-          </a:prstGeom>
-          <a:noFill/>
-        </p:spPr>
-        <p:txBody>
-          <a:bodyPr wrap="square">
-            <a:spAutoFit/>
-          </a:bodyPr>
-          <a:lstStyle/>
-          <a:p>
-            <a:pPr>
-              <a:defRPr sz="3600" b="1">
-                <a:solidFill>
-                  <a:srgbClr val="1A1A1A"/>
-                </a:solidFill>
-                <a:latin typeface="Arial"/>
-              </a:defRPr>
-            </a:pPr>
-            <a:r>
-              <a:t>A behaviour rehearsal engine</a:t>
-            </a:r>
-          </a:p>
-        </p:txBody>
-      </p:sp>
-      <p:sp>
-        <p:nvSpPr>
-          <p:cNvPr id="4" name="TextBox 3"/>
-          <p:cNvSpPr txBox="1"/>
-          <p:nvPr/>
-        </p:nvSpPr>
-        <p:spPr>
-          <a:xfrm>
-            <a:off x="914400" y="1645920"/>
-            <a:ext cx="5486400" cy="548640"/>
+            <a:off x="731520" y="457200"/>
+            <a:ext cx="5486400" cy="365760"/>
           </a:xfrm>
           <a:prstGeom prst="rect">
             <a:avLst/>
@@ -3852,7 +4111,79 @@
             <a:pPr>
               <a:defRPr sz="1600" b="0">
                 <a:solidFill>
-                  <a:srgbClr val="4A4A4A"/>
+                  <a:srgbClr val="10A37F"/>
+                </a:solidFill>
+                <a:latin typeface="Arial"/>
+              </a:defRPr>
+            </a:pPr>
+            <a:r>
+              <a:t>How we fix it</a:t>
+            </a:r>
+          </a:p>
+        </p:txBody>
+      </p:sp>
+      <p:sp>
+        <p:nvSpPr>
+          <p:cNvPr id="3" name="TextBox 2"/>
+          <p:cNvSpPr txBox="1"/>
+          <p:nvPr/>
+        </p:nvSpPr>
+        <p:spPr>
+          <a:xfrm>
+            <a:off x="731520" y="914400"/>
+            <a:ext cx="5486400" cy="640080"/>
+          </a:xfrm>
+          <a:prstGeom prst="rect">
+            <a:avLst/>
+          </a:prstGeom>
+          <a:noFill/>
+        </p:spPr>
+        <p:txBody>
+          <a:bodyPr wrap="square">
+            <a:spAutoFit/>
+          </a:bodyPr>
+          <a:lstStyle/>
+          <a:p>
+            <a:pPr>
+              <a:defRPr sz="3200" b="1">
+                <a:solidFill>
+                  <a:srgbClr val="FFFFFF"/>
+                </a:solidFill>
+                <a:latin typeface="Arial"/>
+              </a:defRPr>
+            </a:pPr>
+            <a:r>
+              <a:t>A behaviour rehearsal engine</a:t>
+            </a:r>
+          </a:p>
+        </p:txBody>
+      </p:sp>
+      <p:sp>
+        <p:nvSpPr>
+          <p:cNvPr id="4" name="TextBox 3"/>
+          <p:cNvSpPr txBox="1"/>
+          <p:nvPr/>
+        </p:nvSpPr>
+        <p:spPr>
+          <a:xfrm>
+            <a:off x="731520" y="1645920"/>
+            <a:ext cx="5029200" cy="457200"/>
+          </a:xfrm>
+          <a:prstGeom prst="rect">
+            <a:avLst/>
+          </a:prstGeom>
+          <a:noFill/>
+        </p:spPr>
+        <p:txBody>
+          <a:bodyPr wrap="square">
+            <a:spAutoFit/>
+          </a:bodyPr>
+          <a:lstStyle/>
+          <a:p>
+            <a:pPr>
+              <a:defRPr sz="1400" b="0">
+                <a:solidFill>
+                  <a:srgbClr val="A0A0A0"/>
                 </a:solidFill>
                 <a:latin typeface="Arial"/>
               </a:defRPr>
@@ -3871,14 +4202,14 @@
         </p:nvSpPr>
         <p:spPr>
           <a:xfrm>
-            <a:off x="914400" y="2743200"/>
-            <a:ext cx="2743200" cy="1463040"/>
+            <a:off x="731520" y="2560320"/>
+            <a:ext cx="2743200" cy="1188720"/>
           </a:xfrm>
           <a:prstGeom prst="roundRect">
             <a:avLst/>
           </a:prstGeom>
           <a:solidFill>
-            <a:srgbClr val="FFFFFF"/>
+            <a:srgbClr val="2A2A2A"/>
           </a:solidFill>
           <a:ln>
             <a:noFill/>
@@ -3914,8 +4245,8 @@
         </p:nvSpPr>
         <p:spPr>
           <a:xfrm>
-            <a:off x="1097280" y="2926080"/>
-            <a:ext cx="2377440" cy="457200"/>
+            <a:off x="914400" y="2743200"/>
+            <a:ext cx="2377440" cy="365760"/>
           </a:xfrm>
           <a:prstGeom prst="rect">
             <a:avLst/>
@@ -3929,9 +4260,9 @@
           <a:lstStyle/>
           <a:p>
             <a:pPr>
-              <a:defRPr sz="1400" b="1">
-                <a:solidFill>
-                  <a:srgbClr val="0D6B56"/>
+              <a:defRPr sz="1300" b="1">
+                <a:solidFill>
+                  <a:srgbClr val="10A37F"/>
                 </a:solidFill>
                 <a:latin typeface="Arial"/>
               </a:defRPr>
@@ -3950,8 +4281,8 @@
         </p:nvSpPr>
         <p:spPr>
           <a:xfrm>
-            <a:off x="1097280" y="3291840"/>
-            <a:ext cx="2377440" cy="1097280"/>
+            <a:off x="914400" y="3108960"/>
+            <a:ext cx="2377440" cy="914400"/>
           </a:xfrm>
           <a:prstGeom prst="rect">
             <a:avLst/>
@@ -3965,9 +4296,9 @@
           <a:lstStyle/>
           <a:p>
             <a:pPr>
-              <a:defRPr sz="1100" b="0">
-                <a:solidFill>
-                  <a:srgbClr val="4A4A4A"/>
+              <a:defRPr sz="1000" b="0">
+                <a:solidFill>
+                  <a:srgbClr val="A0A0A0"/>
                 </a:solidFill>
                 <a:latin typeface="Arial"/>
               </a:defRPr>
@@ -3986,14 +4317,14 @@
         </p:nvSpPr>
         <p:spPr>
           <a:xfrm>
-            <a:off x="3840480" y="2743200"/>
-            <a:ext cx="2743200" cy="1463040"/>
+            <a:off x="3657600" y="2560320"/>
+            <a:ext cx="2743200" cy="1188720"/>
           </a:xfrm>
           <a:prstGeom prst="roundRect">
             <a:avLst/>
           </a:prstGeom>
           <a:solidFill>
-            <a:srgbClr val="FFFFFF"/>
+            <a:srgbClr val="2A2A2A"/>
           </a:solidFill>
           <a:ln>
             <a:noFill/>
@@ -4029,8 +4360,8 @@
         </p:nvSpPr>
         <p:spPr>
           <a:xfrm>
-            <a:off x="4023360" y="2926080"/>
-            <a:ext cx="2377440" cy="457200"/>
+            <a:off x="3840480" y="2743200"/>
+            <a:ext cx="2377440" cy="365760"/>
           </a:xfrm>
           <a:prstGeom prst="rect">
             <a:avLst/>
@@ -4044,9 +4375,9 @@
           <a:lstStyle/>
           <a:p>
             <a:pPr>
-              <a:defRPr sz="1400" b="1">
-                <a:solidFill>
-                  <a:srgbClr val="0D6B56"/>
+              <a:defRPr sz="1300" b="1">
+                <a:solidFill>
+                  <a:srgbClr val="10A37F"/>
                 </a:solidFill>
                 <a:latin typeface="Arial"/>
               </a:defRPr>
@@ -4065,8 +4396,8 @@
         </p:nvSpPr>
         <p:spPr>
           <a:xfrm>
-            <a:off x="4023360" y="3291840"/>
-            <a:ext cx="2377440" cy="1097280"/>
+            <a:off x="3840480" y="3108960"/>
+            <a:ext cx="2377440" cy="914400"/>
           </a:xfrm>
           <a:prstGeom prst="rect">
             <a:avLst/>
@@ -4080,9 +4411,9 @@
           <a:lstStyle/>
           <a:p>
             <a:pPr>
-              <a:defRPr sz="1100" b="0">
-                <a:solidFill>
-                  <a:srgbClr val="4A4A4A"/>
+              <a:defRPr sz="1000" b="0">
+                <a:solidFill>
+                  <a:srgbClr val="A0A0A0"/>
                 </a:solidFill>
                 <a:latin typeface="Arial"/>
               </a:defRPr>
@@ -4101,14 +4432,14 @@
         </p:nvSpPr>
         <p:spPr>
           <a:xfrm>
-            <a:off x="914400" y="4389120"/>
-            <a:ext cx="2743200" cy="1463040"/>
+            <a:off x="731520" y="4023360"/>
+            <a:ext cx="2743200" cy="1188720"/>
           </a:xfrm>
           <a:prstGeom prst="roundRect">
             <a:avLst/>
           </a:prstGeom>
           <a:solidFill>
-            <a:srgbClr val="FFFFFF"/>
+            <a:srgbClr val="2A2A2A"/>
           </a:solidFill>
           <a:ln>
             <a:noFill/>
@@ -4144,8 +4475,8 @@
         </p:nvSpPr>
         <p:spPr>
           <a:xfrm>
-            <a:off x="1097280" y="4572000"/>
-            <a:ext cx="2377440" cy="457200"/>
+            <a:off x="914400" y="4206240"/>
+            <a:ext cx="2377440" cy="365760"/>
           </a:xfrm>
           <a:prstGeom prst="rect">
             <a:avLst/>
@@ -4159,9 +4490,9 @@
           <a:lstStyle/>
           <a:p>
             <a:pPr>
-              <a:defRPr sz="1400" b="1">
-                <a:solidFill>
-                  <a:srgbClr val="0D6B56"/>
+              <a:defRPr sz="1300" b="1">
+                <a:solidFill>
+                  <a:srgbClr val="10A37F"/>
                 </a:solidFill>
                 <a:latin typeface="Arial"/>
               </a:defRPr>
@@ -4180,8 +4511,8 @@
         </p:nvSpPr>
         <p:spPr>
           <a:xfrm>
-            <a:off x="1097280" y="4937759"/>
-            <a:ext cx="2377440" cy="1097280"/>
+            <a:off x="914400" y="4572000"/>
+            <a:ext cx="2377440" cy="914400"/>
           </a:xfrm>
           <a:prstGeom prst="rect">
             <a:avLst/>
@@ -4195,9 +4526,9 @@
           <a:lstStyle/>
           <a:p>
             <a:pPr>
-              <a:defRPr sz="1100" b="0">
-                <a:solidFill>
-                  <a:srgbClr val="4A4A4A"/>
+              <a:defRPr sz="1000" b="0">
+                <a:solidFill>
+                  <a:srgbClr val="A0A0A0"/>
                 </a:solidFill>
                 <a:latin typeface="Arial"/>
               </a:defRPr>
@@ -4216,14 +4547,14 @@
         </p:nvSpPr>
         <p:spPr>
           <a:xfrm>
-            <a:off x="3840480" y="4389120"/>
-            <a:ext cx="2743200" cy="1463040"/>
+            <a:off x="3657600" y="4023360"/>
+            <a:ext cx="2743200" cy="1188720"/>
           </a:xfrm>
           <a:prstGeom prst="roundRect">
             <a:avLst/>
           </a:prstGeom>
           <a:solidFill>
-            <a:srgbClr val="FFFFFF"/>
+            <a:srgbClr val="2A2A2A"/>
           </a:solidFill>
           <a:ln>
             <a:noFill/>
@@ -4259,8 +4590,8 @@
         </p:nvSpPr>
         <p:spPr>
           <a:xfrm>
-            <a:off x="4023360" y="4572000"/>
-            <a:ext cx="2377440" cy="457200"/>
+            <a:off x="3840480" y="4206240"/>
+            <a:ext cx="2377440" cy="365760"/>
           </a:xfrm>
           <a:prstGeom prst="rect">
             <a:avLst/>
@@ -4274,9 +4605,9 @@
           <a:lstStyle/>
           <a:p>
             <a:pPr>
-              <a:defRPr sz="1400" b="1">
-                <a:solidFill>
-                  <a:srgbClr val="0D6B56"/>
+              <a:defRPr sz="1300" b="1">
+                <a:solidFill>
+                  <a:srgbClr val="10A37F"/>
                 </a:solidFill>
                 <a:latin typeface="Arial"/>
               </a:defRPr>
@@ -4295,8 +4626,8 @@
         </p:nvSpPr>
         <p:spPr>
           <a:xfrm>
-            <a:off x="4023360" y="4937759"/>
-            <a:ext cx="2377440" cy="1097280"/>
+            <a:off x="3840480" y="4572000"/>
+            <a:ext cx="2377440" cy="914400"/>
           </a:xfrm>
           <a:prstGeom prst="rect">
             <a:avLst/>
@@ -4310,15 +4641,94 @@
           <a:lstStyle/>
           <a:p>
             <a:pPr>
-              <a:defRPr sz="1100" b="0">
-                <a:solidFill>
-                  <a:srgbClr val="4A4A4A"/>
+              <a:defRPr sz="1000" b="0">
+                <a:solidFill>
+                  <a:srgbClr val="A0A0A0"/>
                 </a:solidFill>
                 <a:latin typeface="Arial"/>
               </a:defRPr>
             </a:pPr>
             <a:r>
               <a:t>Structured training for any goal</a:t>
+            </a:r>
+          </a:p>
+        </p:txBody>
+      </p:sp>
+      <p:sp>
+        <p:nvSpPr>
+          <p:cNvPr id="17" name="Rounded Rectangle 16"/>
+          <p:cNvSpPr/>
+          <p:nvPr/>
+        </p:nvSpPr>
+        <p:spPr>
+          <a:xfrm>
+            <a:off x="6858000" y="1371600"/>
+            <a:ext cx="4572000" cy="4114800"/>
+          </a:xfrm>
+          <a:prstGeom prst="roundRect">
+            <a:avLst/>
+          </a:prstGeom>
+          <a:solidFill>
+            <a:srgbClr val="2A2A2A"/>
+          </a:solidFill>
+          <a:ln>
+            <a:noFill/>
+          </a:ln>
+        </p:spPr>
+        <p:style>
+          <a:lnRef idx="1">
+            <a:schemeClr val="accent1"/>
+          </a:lnRef>
+          <a:fillRef idx="3">
+            <a:schemeClr val="accent1"/>
+          </a:fillRef>
+          <a:effectRef idx="2">
+            <a:schemeClr val="accent1"/>
+          </a:effectRef>
+          <a:fontRef idx="minor">
+            <a:schemeClr val="lt1"/>
+          </a:fontRef>
+        </p:style>
+        <p:txBody>
+          <a:bodyPr rtlCol="0" anchor="ctr"/>
+          <a:lstStyle/>
+          <a:p>
+            <a:pPr algn="ctr"/>
+          </a:p>
+        </p:txBody>
+      </p:sp>
+      <p:sp>
+        <p:nvSpPr>
+          <p:cNvPr id="18" name="TextBox 17"/>
+          <p:cNvSpPr txBox="1"/>
+          <p:nvPr/>
+        </p:nvSpPr>
+        <p:spPr>
+          <a:xfrm>
+            <a:off x="7315200" y="3200400"/>
+            <a:ext cx="3657600" cy="457200"/>
+          </a:xfrm>
+          <a:prstGeom prst="rect">
+            <a:avLst/>
+          </a:prstGeom>
+          <a:noFill/>
+        </p:spPr>
+        <p:txBody>
+          <a:bodyPr wrap="square">
+            <a:spAutoFit/>
+          </a:bodyPr>
+          <a:lstStyle/>
+          <a:p>
+            <a:pPr algn="ctr">
+              <a:defRPr sz="1400" b="0">
+                <a:solidFill>
+                  <a:srgbClr val="A0A0A0"/>
+                </a:solidFill>
+                <a:latin typeface="Arial"/>
+              </a:defRPr>
+            </a:pPr>
+            <a:r>
+              <a:t>📸 Medical Professional Image</a:t>
             </a:r>
           </a:p>
         </p:txBody>
@@ -4337,7 +4747,7 @@
     <p:bg>
       <p:bgPr>
         <a:solidFill>
-          <a:srgbClr val="C7F464"/>
+          <a:srgbClr val="1A1A1A"/>
         </a:solidFill>
         <a:effectLst/>
       </p:bgPr>
@@ -4357,8 +4767,8 @@
         </p:nvSpPr>
         <p:spPr>
           <a:xfrm>
-            <a:off x="914400" y="457200"/>
-            <a:ext cx="10058400" cy="731520"/>
+            <a:off x="731520" y="457200"/>
+            <a:ext cx="10058400" cy="640080"/>
           </a:xfrm>
           <a:prstGeom prst="rect">
             <a:avLst/>
@@ -4372,9 +4782,9 @@
           <a:lstStyle/>
           <a:p>
             <a:pPr>
-              <a:defRPr sz="3200" b="1">
-                <a:solidFill>
-                  <a:srgbClr val="1A1A1A"/>
+              <a:defRPr sz="2800" b="1">
+                <a:solidFill>
+                  <a:srgbClr val="FFFFFF"/>
                 </a:solidFill>
                 <a:latin typeface="Arial"/>
               </a:defRPr>
@@ -4394,13 +4804,13 @@
         <p:spPr>
           <a:xfrm>
             <a:off x="731520" y="1645920"/>
-            <a:ext cx="3474720" cy="1280160"/>
+            <a:ext cx="3474720" cy="1188720"/>
           </a:xfrm>
           <a:prstGeom prst="roundRect">
             <a:avLst/>
           </a:prstGeom>
           <a:solidFill>
-            <a:srgbClr val="FFFFFF"/>
+            <a:srgbClr val="2A2A2A"/>
           </a:solidFill>
           <a:ln>
             <a:noFill/>
@@ -4437,7 +4847,7 @@
         <p:spPr>
           <a:xfrm>
             <a:off x="914400" y="1828800"/>
-            <a:ext cx="3108960" cy="457200"/>
+            <a:ext cx="3108960" cy="365760"/>
           </a:xfrm>
           <a:prstGeom prst="rect">
             <a:avLst/>
@@ -4451,9 +4861,9 @@
           <a:lstStyle/>
           <a:p>
             <a:pPr>
-              <a:defRPr sz="1400" b="1">
-                <a:solidFill>
-                  <a:srgbClr val="0D6B56"/>
+              <a:defRPr sz="1300" b="1">
+                <a:solidFill>
+                  <a:srgbClr val="FFFFFF"/>
                 </a:solidFill>
                 <a:latin typeface="Arial"/>
               </a:defRPr>
@@ -4473,7 +4883,7 @@
         <p:spPr>
           <a:xfrm>
             <a:off x="914400" y="2194560"/>
-            <a:ext cx="3108960" cy="1097280"/>
+            <a:ext cx="3108960" cy="914400"/>
           </a:xfrm>
           <a:prstGeom prst="rect">
             <a:avLst/>
@@ -4487,9 +4897,9 @@
           <a:lstStyle/>
           <a:p>
             <a:pPr>
-              <a:defRPr sz="1100" b="0">
-                <a:solidFill>
-                  <a:srgbClr val="4A4A4A"/>
+              <a:defRPr sz="1000" b="0">
+                <a:solidFill>
+                  <a:srgbClr val="A0A0A0"/>
                 </a:solidFill>
                 <a:latin typeface="Arial"/>
               </a:defRPr>
@@ -4509,13 +4919,13 @@
         <p:spPr>
           <a:xfrm>
             <a:off x="4480559" y="1645920"/>
-            <a:ext cx="3474720" cy="1280160"/>
+            <a:ext cx="3474720" cy="1188720"/>
           </a:xfrm>
           <a:prstGeom prst="roundRect">
             <a:avLst/>
           </a:prstGeom>
           <a:solidFill>
-            <a:srgbClr val="FFFFFF"/>
+            <a:srgbClr val="2A2A2A"/>
           </a:solidFill>
           <a:ln>
             <a:noFill/>
@@ -4552,7 +4962,7 @@
         <p:spPr>
           <a:xfrm>
             <a:off x="4663440" y="1828800"/>
-            <a:ext cx="3108960" cy="457200"/>
+            <a:ext cx="3108960" cy="365760"/>
           </a:xfrm>
           <a:prstGeom prst="rect">
             <a:avLst/>
@@ -4566,9 +4976,9 @@
           <a:lstStyle/>
           <a:p>
             <a:pPr>
-              <a:defRPr sz="1400" b="1">
-                <a:solidFill>
-                  <a:srgbClr val="0D6B56"/>
+              <a:defRPr sz="1300" b="1">
+                <a:solidFill>
+                  <a:srgbClr val="FFFFFF"/>
                 </a:solidFill>
                 <a:latin typeface="Arial"/>
               </a:defRPr>
@@ -4588,7 +4998,7 @@
         <p:spPr>
           <a:xfrm>
             <a:off x="4663440" y="2194560"/>
-            <a:ext cx="3108960" cy="1097280"/>
+            <a:ext cx="3108960" cy="914400"/>
           </a:xfrm>
           <a:prstGeom prst="rect">
             <a:avLst/>
@@ -4602,9 +5012,9 @@
           <a:lstStyle/>
           <a:p>
             <a:pPr>
-              <a:defRPr sz="1100" b="0">
-                <a:solidFill>
-                  <a:srgbClr val="4A4A4A"/>
+              <a:defRPr sz="1000" b="0">
+                <a:solidFill>
+                  <a:srgbClr val="A0A0A0"/>
                 </a:solidFill>
                 <a:latin typeface="Arial"/>
               </a:defRPr>
@@ -4624,13 +5034,13 @@
         <p:spPr>
           <a:xfrm>
             <a:off x="8229600" y="1645920"/>
-            <a:ext cx="3474720" cy="1280160"/>
+            <a:ext cx="3474720" cy="1188720"/>
           </a:xfrm>
           <a:prstGeom prst="roundRect">
             <a:avLst/>
           </a:prstGeom>
           <a:solidFill>
-            <a:srgbClr val="FFFFFF"/>
+            <a:srgbClr val="2A2A2A"/>
           </a:solidFill>
           <a:ln>
             <a:noFill/>
@@ -4667,7 +5077,7 @@
         <p:spPr>
           <a:xfrm>
             <a:off x="8412480" y="1828800"/>
-            <a:ext cx="3108960" cy="457200"/>
+            <a:ext cx="3108960" cy="365760"/>
           </a:xfrm>
           <a:prstGeom prst="rect">
             <a:avLst/>
@@ -4681,9 +5091,9 @@
           <a:lstStyle/>
           <a:p>
             <a:pPr>
-              <a:defRPr sz="1400" b="1">
-                <a:solidFill>
-                  <a:srgbClr val="0D6B56"/>
+              <a:defRPr sz="1300" b="1">
+                <a:solidFill>
+                  <a:srgbClr val="FFFFFF"/>
                 </a:solidFill>
                 <a:latin typeface="Arial"/>
               </a:defRPr>
@@ -4703,7 +5113,7 @@
         <p:spPr>
           <a:xfrm>
             <a:off x="8412480" y="2194560"/>
-            <a:ext cx="3108960" cy="1097280"/>
+            <a:ext cx="3108960" cy="914400"/>
           </a:xfrm>
           <a:prstGeom prst="rect">
             <a:avLst/>
@@ -4717,9 +5127,9 @@
           <a:lstStyle/>
           <a:p>
             <a:pPr>
-              <a:defRPr sz="1100" b="0">
-                <a:solidFill>
-                  <a:srgbClr val="4A4A4A"/>
+              <a:defRPr sz="1000" b="0">
+                <a:solidFill>
+                  <a:srgbClr val="A0A0A0"/>
                 </a:solidFill>
                 <a:latin typeface="Arial"/>
               </a:defRPr>
@@ -4738,14 +5148,14 @@
         </p:nvSpPr>
         <p:spPr>
           <a:xfrm>
-            <a:off x="731520" y="3200400"/>
-            <a:ext cx="3474720" cy="1280160"/>
+            <a:off x="731520" y="3108960"/>
+            <a:ext cx="3474720" cy="1188720"/>
           </a:xfrm>
           <a:prstGeom prst="roundRect">
             <a:avLst/>
           </a:prstGeom>
           <a:solidFill>
-            <a:srgbClr val="FFFFFF"/>
+            <a:srgbClr val="2A2A2A"/>
           </a:solidFill>
           <a:ln>
             <a:noFill/>
@@ -4781,8 +5191,8 @@
         </p:nvSpPr>
         <p:spPr>
           <a:xfrm>
-            <a:off x="914400" y="3383280"/>
-            <a:ext cx="3108960" cy="457200"/>
+            <a:off x="914400" y="3291840"/>
+            <a:ext cx="3108960" cy="365760"/>
           </a:xfrm>
           <a:prstGeom prst="rect">
             <a:avLst/>
@@ -4796,9 +5206,9 @@
           <a:lstStyle/>
           <a:p>
             <a:pPr>
-              <a:defRPr sz="1400" b="1">
-                <a:solidFill>
-                  <a:srgbClr val="0D6B56"/>
+              <a:defRPr sz="1300" b="1">
+                <a:solidFill>
+                  <a:srgbClr val="FFFFFF"/>
                 </a:solidFill>
                 <a:latin typeface="Arial"/>
               </a:defRPr>
@@ -4817,8 +5227,8 @@
         </p:nvSpPr>
         <p:spPr>
           <a:xfrm>
-            <a:off x="914400" y="3749039"/>
-            <a:ext cx="3108960" cy="1097280"/>
+            <a:off x="914400" y="3657600"/>
+            <a:ext cx="3108960" cy="914400"/>
           </a:xfrm>
           <a:prstGeom prst="rect">
             <a:avLst/>
@@ -4832,9 +5242,9 @@
           <a:lstStyle/>
           <a:p>
             <a:pPr>
-              <a:defRPr sz="1100" b="0">
-                <a:solidFill>
-                  <a:srgbClr val="4A4A4A"/>
+              <a:defRPr sz="1000" b="0">
+                <a:solidFill>
+                  <a:srgbClr val="A0A0A0"/>
                 </a:solidFill>
                 <a:latin typeface="Arial"/>
               </a:defRPr>
@@ -4853,14 +5263,14 @@
         </p:nvSpPr>
         <p:spPr>
           <a:xfrm>
-            <a:off x="4480559" y="3200400"/>
-            <a:ext cx="3474720" cy="1280160"/>
+            <a:off x="4480559" y="3108960"/>
+            <a:ext cx="3474720" cy="1188720"/>
           </a:xfrm>
           <a:prstGeom prst="roundRect">
             <a:avLst/>
           </a:prstGeom>
           <a:solidFill>
-            <a:srgbClr val="FFFFFF"/>
+            <a:srgbClr val="2A2A2A"/>
           </a:solidFill>
           <a:ln>
             <a:noFill/>
@@ -4896,8 +5306,8 @@
         </p:nvSpPr>
         <p:spPr>
           <a:xfrm>
-            <a:off x="4663440" y="3383280"/>
-            <a:ext cx="3108960" cy="457200"/>
+            <a:off x="4663440" y="3291840"/>
+            <a:ext cx="3108960" cy="365760"/>
           </a:xfrm>
           <a:prstGeom prst="rect">
             <a:avLst/>
@@ -4911,9 +5321,9 @@
           <a:lstStyle/>
           <a:p>
             <a:pPr>
-              <a:defRPr sz="1400" b="1">
-                <a:solidFill>
-                  <a:srgbClr val="0D6B56"/>
+              <a:defRPr sz="1300" b="1">
+                <a:solidFill>
+                  <a:srgbClr val="FFFFFF"/>
                 </a:solidFill>
                 <a:latin typeface="Arial"/>
               </a:defRPr>
@@ -4932,8 +5342,8 @@
         </p:nvSpPr>
         <p:spPr>
           <a:xfrm>
-            <a:off x="4663440" y="3749039"/>
-            <a:ext cx="3108960" cy="1097280"/>
+            <a:off x="4663440" y="3657600"/>
+            <a:ext cx="3108960" cy="914400"/>
           </a:xfrm>
           <a:prstGeom prst="rect">
             <a:avLst/>
@@ -4947,9 +5357,9 @@
           <a:lstStyle/>
           <a:p>
             <a:pPr>
-              <a:defRPr sz="1100" b="0">
-                <a:solidFill>
-                  <a:srgbClr val="4A4A4A"/>
+              <a:defRPr sz="1000" b="0">
+                <a:solidFill>
+                  <a:srgbClr val="A0A0A0"/>
                 </a:solidFill>
                 <a:latin typeface="Arial"/>
               </a:defRPr>
@@ -4968,14 +5378,14 @@
         </p:nvSpPr>
         <p:spPr>
           <a:xfrm>
-            <a:off x="8229600" y="3200400"/>
-            <a:ext cx="3474720" cy="1280160"/>
+            <a:off x="8229600" y="3108960"/>
+            <a:ext cx="3474720" cy="1188720"/>
           </a:xfrm>
           <a:prstGeom prst="roundRect">
             <a:avLst/>
           </a:prstGeom>
           <a:solidFill>
-            <a:srgbClr val="FFFFFF"/>
+            <a:srgbClr val="2A2A2A"/>
           </a:solidFill>
           <a:ln>
             <a:noFill/>
@@ -5011,8 +5421,8 @@
         </p:nvSpPr>
         <p:spPr>
           <a:xfrm>
-            <a:off x="8412480" y="3383280"/>
-            <a:ext cx="3108960" cy="457200"/>
+            <a:off x="8412480" y="3291840"/>
+            <a:ext cx="3108960" cy="365760"/>
           </a:xfrm>
           <a:prstGeom prst="rect">
             <a:avLst/>
@@ -5026,9 +5436,9 @@
           <a:lstStyle/>
           <a:p>
             <a:pPr>
-              <a:defRPr sz="1400" b="1">
-                <a:solidFill>
-                  <a:srgbClr val="0D6B56"/>
+              <a:defRPr sz="1300" b="1">
+                <a:solidFill>
+                  <a:srgbClr val="FFFFFF"/>
                 </a:solidFill>
                 <a:latin typeface="Arial"/>
               </a:defRPr>
@@ -5047,8 +5457,8 @@
         </p:nvSpPr>
         <p:spPr>
           <a:xfrm>
-            <a:off x="8412480" y="3749039"/>
-            <a:ext cx="3108960" cy="1097280"/>
+            <a:off x="8412480" y="3657600"/>
+            <a:ext cx="3108960" cy="914400"/>
           </a:xfrm>
           <a:prstGeom prst="rect">
             <a:avLst/>
@@ -5062,9 +5472,9 @@
           <a:lstStyle/>
           <a:p>
             <a:pPr>
-              <a:defRPr sz="1100" b="0">
-                <a:solidFill>
-                  <a:srgbClr val="4A4A4A"/>
+              <a:defRPr sz="1000" b="0">
+                <a:solidFill>
+                  <a:srgbClr val="A0A0A0"/>
                 </a:solidFill>
                 <a:latin typeface="Arial"/>
               </a:defRPr>
@@ -5089,7 +5499,7 @@
     <p:bg>
       <p:bgPr>
         <a:solidFill>
-          <a:srgbClr val="C7F464"/>
+          <a:srgbClr val="1A1A1A"/>
         </a:solidFill>
         <a:effectLst/>
       </p:bgPr>
@@ -5109,8 +5519,8 @@
         </p:nvSpPr>
         <p:spPr>
           <a:xfrm>
-            <a:off x="914400" y="457200"/>
-            <a:ext cx="10058400" cy="731520"/>
+            <a:off x="731520" y="457200"/>
+            <a:ext cx="10058400" cy="640080"/>
           </a:xfrm>
           <a:prstGeom prst="rect">
             <a:avLst/>
@@ -5124,9 +5534,9 @@
           <a:lstStyle/>
           <a:p>
             <a:pPr>
-              <a:defRPr sz="3600" b="1">
-                <a:solidFill>
-                  <a:srgbClr val="1A1A1A"/>
+              <a:defRPr sz="3200" b="1">
+                <a:solidFill>
+                  <a:srgbClr val="FFFFFF"/>
                 </a:solidFill>
                 <a:latin typeface="Arial"/>
               </a:defRPr>
@@ -5139,44 +5549,37 @@
       </p:sp>
       <p:sp>
         <p:nvSpPr>
-          <p:cNvPr id="3" name="Rounded Rectangle 2"/>
-          <p:cNvSpPr/>
-          <p:nvPr/>
-        </p:nvSpPr>
-        <p:spPr>
-          <a:xfrm>
-            <a:off x="731520" y="2286000"/>
-            <a:ext cx="2560320" cy="2743200"/>
-          </a:xfrm>
-          <a:prstGeom prst="roundRect">
-            <a:avLst/>
-          </a:prstGeom>
-          <a:solidFill>
-            <a:srgbClr val="FFFFFF"/>
-          </a:solidFill>
-          <a:ln>
-            <a:noFill/>
-          </a:ln>
-        </p:spPr>
-        <p:style>
-          <a:lnRef idx="1">
-            <a:schemeClr val="accent1"/>
-          </a:lnRef>
-          <a:fillRef idx="3">
-            <a:schemeClr val="accent1"/>
-          </a:fillRef>
-          <a:effectRef idx="2">
-            <a:schemeClr val="accent1"/>
-          </a:effectRef>
-          <a:fontRef idx="minor">
-            <a:schemeClr val="lt1"/>
-          </a:fontRef>
-        </p:style>
-        <p:txBody>
-          <a:bodyPr rtlCol="0" anchor="ctr"/>
-          <a:lstStyle/>
-          <a:p>
-            <a:pPr algn="ctr"/>
+          <p:cNvPr id="3" name="TextBox 2"/>
+          <p:cNvSpPr txBox="1"/>
+          <p:nvPr/>
+        </p:nvSpPr>
+        <p:spPr>
+          <a:xfrm>
+            <a:off x="731520" y="1097280"/>
+            <a:ext cx="10058400" cy="365760"/>
+          </a:xfrm>
+          <a:prstGeom prst="rect">
+            <a:avLst/>
+          </a:prstGeom>
+          <a:noFill/>
+        </p:spPr>
+        <p:txBody>
+          <a:bodyPr wrap="square">
+            <a:spAutoFit/>
+          </a:bodyPr>
+          <a:lstStyle/>
+          <a:p>
+            <a:pPr>
+              <a:defRPr sz="1400" b="0">
+                <a:solidFill>
+                  <a:srgbClr val="A0A0A0"/>
+                </a:solidFill>
+                <a:latin typeface="Arial"/>
+              </a:defRPr>
+            </a:pPr>
+            <a:r>
+              <a:t>From signup to simulation in minutes</a:t>
+            </a:r>
           </a:p>
         </p:txBody>
       </p:sp>
@@ -5188,8 +5591,8 @@
         </p:nvSpPr>
         <p:spPr>
           <a:xfrm>
-            <a:off x="1645920" y="2560320"/>
-            <a:ext cx="731520" cy="731520"/>
+            <a:off x="1645920" y="2286000"/>
+            <a:ext cx="822960" cy="822960"/>
           </a:xfrm>
           <a:prstGeom prst="ellipse">
             <a:avLst/>
@@ -5231,8 +5634,8 @@
         </p:nvSpPr>
         <p:spPr>
           <a:xfrm>
-            <a:off x="1874519" y="2651760"/>
-            <a:ext cx="457200" cy="457200"/>
+            <a:off x="1828800" y="2377440"/>
+            <a:ext cx="548640" cy="548640"/>
           </a:xfrm>
           <a:prstGeom prst="rect">
             <a:avLst/>
@@ -5246,7 +5649,7 @@
           <a:lstStyle/>
           <a:p>
             <a:pPr>
-              <a:defRPr sz="2400" b="1">
+              <a:defRPr sz="2800" b="1">
                 <a:solidFill>
                   <a:srgbClr val="FFFFFF"/>
                 </a:solidFill>
@@ -5267,8 +5670,8 @@
         </p:nvSpPr>
         <p:spPr>
           <a:xfrm>
-            <a:off x="1005840" y="3566160"/>
-            <a:ext cx="2011680" cy="457200"/>
+            <a:off x="731520" y="3474720"/>
+            <a:ext cx="2743200" cy="457200"/>
           </a:xfrm>
           <a:prstGeom prst="rect">
             <a:avLst/>
@@ -5284,7 +5687,7 @@
             <a:pPr algn="ctr">
               <a:defRPr sz="1800" b="1">
                 <a:solidFill>
-                  <a:srgbClr val="1A1A1A"/>
+                  <a:srgbClr val="FFFFFF"/>
                 </a:solidFill>
                 <a:latin typeface="Arial"/>
               </a:defRPr>
@@ -5303,8 +5706,8 @@
         </p:nvSpPr>
         <p:spPr>
           <a:xfrm>
-            <a:off x="1005840" y="4114800"/>
-            <a:ext cx="2011680" cy="914400"/>
+            <a:off x="731520" y="4023360"/>
+            <a:ext cx="2743200" cy="731520"/>
           </a:xfrm>
           <a:prstGeom prst="rect">
             <a:avLst/>
@@ -5318,76 +5721,29 @@
           <a:lstStyle/>
           <a:p>
             <a:pPr algn="ctr">
-              <a:defRPr sz="1200" b="0">
-                <a:solidFill>
-                  <a:srgbClr val="4A4A4A"/>
-                </a:solidFill>
-                <a:latin typeface="Arial"/>
-              </a:defRPr>
-            </a:pPr>
-            <a:r>
-              <a:t>Access dashboard,</a:t>
-            </a:r>
-            <a:br/>
-            <a:r>
-              <a:t>select package</a:t>
-            </a:r>
-          </a:p>
-        </p:txBody>
-      </p:sp>
-      <p:sp>
-        <p:nvSpPr>
-          <p:cNvPr id="8" name="Rounded Rectangle 7"/>
+              <a:defRPr sz="1100" b="0">
+                <a:solidFill>
+                  <a:srgbClr val="A0A0A0"/>
+                </a:solidFill>
+                <a:latin typeface="Arial"/>
+              </a:defRPr>
+            </a:pPr>
+            <a:r>
+              <a:t>Access dashboard, select package</a:t>
+            </a:r>
+          </a:p>
+        </p:txBody>
+      </p:sp>
+      <p:sp>
+        <p:nvSpPr>
+          <p:cNvPr id="8" name="Oval 7"/>
           <p:cNvSpPr/>
           <p:nvPr/>
         </p:nvSpPr>
         <p:spPr>
           <a:xfrm>
-            <a:off x="3566160" y="2286000"/>
-            <a:ext cx="2560320" cy="2743200"/>
-          </a:xfrm>
-          <a:prstGeom prst="roundRect">
-            <a:avLst/>
-          </a:prstGeom>
-          <a:solidFill>
-            <a:srgbClr val="FFFFFF"/>
-          </a:solidFill>
-          <a:ln>
-            <a:noFill/>
-          </a:ln>
-        </p:spPr>
-        <p:style>
-          <a:lnRef idx="1">
-            <a:schemeClr val="accent1"/>
-          </a:lnRef>
-          <a:fillRef idx="3">
-            <a:schemeClr val="accent1"/>
-          </a:fillRef>
-          <a:effectRef idx="2">
-            <a:schemeClr val="accent1"/>
-          </a:effectRef>
-          <a:fontRef idx="minor">
-            <a:schemeClr val="lt1"/>
-          </a:fontRef>
-        </p:style>
-        <p:txBody>
-          <a:bodyPr rtlCol="0" anchor="ctr"/>
-          <a:lstStyle/>
-          <a:p>
-            <a:pPr algn="ctr"/>
-          </a:p>
-        </p:txBody>
-      </p:sp>
-      <p:sp>
-        <p:nvSpPr>
-          <p:cNvPr id="9" name="Oval 8"/>
-          <p:cNvSpPr/>
-          <p:nvPr/>
-        </p:nvSpPr>
-        <p:spPr>
-          <a:xfrm>
-            <a:off x="4480560" y="2560320"/>
-            <a:ext cx="731520" cy="731520"/>
+            <a:off x="4480560" y="2286000"/>
+            <a:ext cx="822960" cy="822960"/>
           </a:xfrm>
           <a:prstGeom prst="ellipse">
             <a:avLst/>
@@ -5423,50 +5779,50 @@
       </p:sp>
       <p:sp>
         <p:nvSpPr>
+          <p:cNvPr id="9" name="TextBox 8"/>
+          <p:cNvSpPr txBox="1"/>
+          <p:nvPr/>
+        </p:nvSpPr>
+        <p:spPr>
+          <a:xfrm>
+            <a:off x="4663440" y="2377440"/>
+            <a:ext cx="548640" cy="548640"/>
+          </a:xfrm>
+          <a:prstGeom prst="rect">
+            <a:avLst/>
+          </a:prstGeom>
+          <a:noFill/>
+        </p:spPr>
+        <p:txBody>
+          <a:bodyPr wrap="square">
+            <a:spAutoFit/>
+          </a:bodyPr>
+          <a:lstStyle/>
+          <a:p>
+            <a:pPr>
+              <a:defRPr sz="2800" b="1">
+                <a:solidFill>
+                  <a:srgbClr val="FFFFFF"/>
+                </a:solidFill>
+                <a:latin typeface="Arial"/>
+              </a:defRPr>
+            </a:pPr>
+            <a:r>
+              <a:t>2</a:t>
+            </a:r>
+          </a:p>
+        </p:txBody>
+      </p:sp>
+      <p:sp>
+        <p:nvSpPr>
           <p:cNvPr id="10" name="TextBox 9"/>
           <p:cNvSpPr txBox="1"/>
           <p:nvPr/>
         </p:nvSpPr>
         <p:spPr>
           <a:xfrm>
-            <a:off x="4709160" y="2651760"/>
-            <a:ext cx="457200" cy="457200"/>
-          </a:xfrm>
-          <a:prstGeom prst="rect">
-            <a:avLst/>
-          </a:prstGeom>
-          <a:noFill/>
-        </p:spPr>
-        <p:txBody>
-          <a:bodyPr wrap="square">
-            <a:spAutoFit/>
-          </a:bodyPr>
-          <a:lstStyle/>
-          <a:p>
-            <a:pPr>
-              <a:defRPr sz="2400" b="1">
-                <a:solidFill>
-                  <a:srgbClr val="FFFFFF"/>
-                </a:solidFill>
-                <a:latin typeface="Arial"/>
-              </a:defRPr>
-            </a:pPr>
-            <a:r>
-              <a:t>2</a:t>
-            </a:r>
-          </a:p>
-        </p:txBody>
-      </p:sp>
-      <p:sp>
-        <p:nvSpPr>
-          <p:cNvPr id="11" name="TextBox 10"/>
-          <p:cNvSpPr txBox="1"/>
-          <p:nvPr/>
-        </p:nvSpPr>
-        <p:spPr>
-          <a:xfrm>
-            <a:off x="3840480" y="3566160"/>
-            <a:ext cx="2011680" cy="457200"/>
+            <a:off x="3566160" y="3474720"/>
+            <a:ext cx="2743200" cy="457200"/>
           </a:xfrm>
           <a:prstGeom prst="rect">
             <a:avLst/>
@@ -5482,7 +5838,7 @@
             <a:pPr algn="ctr">
               <a:defRPr sz="1800" b="1">
                 <a:solidFill>
-                  <a:srgbClr val="1A1A1A"/>
+                  <a:srgbClr val="FFFFFF"/>
                 </a:solidFill>
                 <a:latin typeface="Arial"/>
               </a:defRPr>
@@ -5495,14 +5851,14 @@
       </p:sp>
       <p:sp>
         <p:nvSpPr>
-          <p:cNvPr id="12" name="TextBox 11"/>
-          <p:cNvSpPr txBox="1"/>
-          <p:nvPr/>
-        </p:nvSpPr>
-        <p:spPr>
-          <a:xfrm>
-            <a:off x="3840480" y="4114800"/>
-            <a:ext cx="2011680" cy="914400"/>
+          <p:cNvPr id="11" name="TextBox 10"/>
+          <p:cNvSpPr txBox="1"/>
+          <p:nvPr/>
+        </p:nvSpPr>
+        <p:spPr>
+          <a:xfrm>
+            <a:off x="3566160" y="4023360"/>
+            <a:ext cx="2743200" cy="731520"/>
           </a:xfrm>
           <a:prstGeom prst="rect">
             <a:avLst/>
@@ -5516,76 +5872,29 @@
           <a:lstStyle/>
           <a:p>
             <a:pPr algn="ctr">
-              <a:defRPr sz="1200" b="0">
-                <a:solidFill>
-                  <a:srgbClr val="4A4A4A"/>
-                </a:solidFill>
-                <a:latin typeface="Arial"/>
-              </a:defRPr>
-            </a:pPr>
-            <a:r>
-              <a:t>Bring your team,</a:t>
-            </a:r>
-            <a:br/>
-            <a:r>
-              <a:t>assign roles</a:t>
-            </a:r>
-          </a:p>
-        </p:txBody>
-      </p:sp>
-      <p:sp>
-        <p:nvSpPr>
-          <p:cNvPr id="13" name="Rounded Rectangle 12"/>
+              <a:defRPr sz="1100" b="0">
+                <a:solidFill>
+                  <a:srgbClr val="A0A0A0"/>
+                </a:solidFill>
+                <a:latin typeface="Arial"/>
+              </a:defRPr>
+            </a:pPr>
+            <a:r>
+              <a:t>Bring team, assign roles</a:t>
+            </a:r>
+          </a:p>
+        </p:txBody>
+      </p:sp>
+      <p:sp>
+        <p:nvSpPr>
+          <p:cNvPr id="12" name="Oval 11"/>
           <p:cNvSpPr/>
           <p:nvPr/>
         </p:nvSpPr>
         <p:spPr>
           <a:xfrm>
-            <a:off x="6400800" y="2286000"/>
-            <a:ext cx="2560320" cy="2743200"/>
-          </a:xfrm>
-          <a:prstGeom prst="roundRect">
-            <a:avLst/>
-          </a:prstGeom>
-          <a:solidFill>
-            <a:srgbClr val="FFFFFF"/>
-          </a:solidFill>
-          <a:ln>
-            <a:noFill/>
-          </a:ln>
-        </p:spPr>
-        <p:style>
-          <a:lnRef idx="1">
-            <a:schemeClr val="accent1"/>
-          </a:lnRef>
-          <a:fillRef idx="3">
-            <a:schemeClr val="accent1"/>
-          </a:fillRef>
-          <a:effectRef idx="2">
-            <a:schemeClr val="accent1"/>
-          </a:effectRef>
-          <a:fontRef idx="minor">
-            <a:schemeClr val="lt1"/>
-          </a:fontRef>
-        </p:style>
-        <p:txBody>
-          <a:bodyPr rtlCol="0" anchor="ctr"/>
-          <a:lstStyle/>
-          <a:p>
-            <a:pPr algn="ctr"/>
-          </a:p>
-        </p:txBody>
-      </p:sp>
-      <p:sp>
-        <p:nvSpPr>
-          <p:cNvPr id="14" name="Oval 13"/>
-          <p:cNvSpPr/>
-          <p:nvPr/>
-        </p:nvSpPr>
-        <p:spPr>
-          <a:xfrm>
-            <a:off x="7315200" y="2560320"/>
-            <a:ext cx="731520" cy="731520"/>
+            <a:off x="7315200" y="2286000"/>
+            <a:ext cx="822960" cy="822960"/>
           </a:xfrm>
           <a:prstGeom prst="ellipse">
             <a:avLst/>
@@ -5621,14 +5930,14 @@
       </p:sp>
       <p:sp>
         <p:nvSpPr>
-          <p:cNvPr id="15" name="TextBox 14"/>
-          <p:cNvSpPr txBox="1"/>
-          <p:nvPr/>
-        </p:nvSpPr>
-        <p:spPr>
-          <a:xfrm>
-            <a:off x="7543800" y="2651760"/>
-            <a:ext cx="457200" cy="457200"/>
+          <p:cNvPr id="13" name="TextBox 12"/>
+          <p:cNvSpPr txBox="1"/>
+          <p:nvPr/>
+        </p:nvSpPr>
+        <p:spPr>
+          <a:xfrm>
+            <a:off x="7498079" y="2377440"/>
+            <a:ext cx="548640" cy="548640"/>
           </a:xfrm>
           <a:prstGeom prst="rect">
             <a:avLst/>
@@ -5642,7 +5951,7 @@
           <a:lstStyle/>
           <a:p>
             <a:pPr>
-              <a:defRPr sz="2400" b="1">
+              <a:defRPr sz="2800" b="1">
                 <a:solidFill>
                   <a:srgbClr val="FFFFFF"/>
                 </a:solidFill>
@@ -5657,14 +5966,14 @@
       </p:sp>
       <p:sp>
         <p:nvSpPr>
-          <p:cNvPr id="16" name="TextBox 15"/>
-          <p:cNvSpPr txBox="1"/>
-          <p:nvPr/>
-        </p:nvSpPr>
-        <p:spPr>
-          <a:xfrm>
-            <a:off x="6675120" y="3566160"/>
-            <a:ext cx="2011680" cy="457200"/>
+          <p:cNvPr id="14" name="TextBox 13"/>
+          <p:cNvSpPr txBox="1"/>
+          <p:nvPr/>
+        </p:nvSpPr>
+        <p:spPr>
+          <a:xfrm>
+            <a:off x="6400800" y="3474720"/>
+            <a:ext cx="2743200" cy="457200"/>
           </a:xfrm>
           <a:prstGeom prst="rect">
             <a:avLst/>
@@ -5680,7 +5989,7 @@
             <a:pPr algn="ctr">
               <a:defRPr sz="1800" b="1">
                 <a:solidFill>
-                  <a:srgbClr val="1A1A1A"/>
+                  <a:srgbClr val="FFFFFF"/>
                 </a:solidFill>
                 <a:latin typeface="Arial"/>
               </a:defRPr>
@@ -5693,14 +6002,14 @@
       </p:sp>
       <p:sp>
         <p:nvSpPr>
-          <p:cNvPr id="17" name="TextBox 16"/>
-          <p:cNvSpPr txBox="1"/>
-          <p:nvPr/>
-        </p:nvSpPr>
-        <p:spPr>
-          <a:xfrm>
-            <a:off x="6675120" y="4114800"/>
-            <a:ext cx="2011680" cy="914400"/>
+          <p:cNvPr id="15" name="TextBox 14"/>
+          <p:cNvSpPr txBox="1"/>
+          <p:nvPr/>
+        </p:nvSpPr>
+        <p:spPr>
+          <a:xfrm>
+            <a:off x="6400800" y="4023360"/>
+            <a:ext cx="2743200" cy="731520"/>
           </a:xfrm>
           <a:prstGeom prst="rect">
             <a:avLst/>
@@ -5714,76 +6023,29 @@
           <a:lstStyle/>
           <a:p>
             <a:pPr algn="ctr">
-              <a:defRPr sz="1200" b="0">
-                <a:solidFill>
-                  <a:srgbClr val="4A4A4A"/>
-                </a:solidFill>
-                <a:latin typeface="Arial"/>
-              </a:defRPr>
-            </a:pPr>
-            <a:r>
-              <a:t>Build agents,</a:t>
-            </a:r>
-            <a:br/>
-            <a:r>
-              <a:t>pathways, campaigns</a:t>
-            </a:r>
-          </a:p>
-        </p:txBody>
-      </p:sp>
-      <p:sp>
-        <p:nvSpPr>
-          <p:cNvPr id="18" name="Rounded Rectangle 17"/>
+              <a:defRPr sz="1100" b="0">
+                <a:solidFill>
+                  <a:srgbClr val="A0A0A0"/>
+                </a:solidFill>
+                <a:latin typeface="Arial"/>
+              </a:defRPr>
+            </a:pPr>
+            <a:r>
+              <a:t>Build agents and pathways</a:t>
+            </a:r>
+          </a:p>
+        </p:txBody>
+      </p:sp>
+      <p:sp>
+        <p:nvSpPr>
+          <p:cNvPr id="16" name="Oval 15"/>
           <p:cNvSpPr/>
           <p:nvPr/>
         </p:nvSpPr>
         <p:spPr>
           <a:xfrm>
-            <a:off x="9235440" y="2286000"/>
-            <a:ext cx="2560320" cy="2743200"/>
-          </a:xfrm>
-          <a:prstGeom prst="roundRect">
-            <a:avLst/>
-          </a:prstGeom>
-          <a:solidFill>
-            <a:srgbClr val="FFFFFF"/>
-          </a:solidFill>
-          <a:ln>
-            <a:noFill/>
-          </a:ln>
-        </p:spPr>
-        <p:style>
-          <a:lnRef idx="1">
-            <a:schemeClr val="accent1"/>
-          </a:lnRef>
-          <a:fillRef idx="3">
-            <a:schemeClr val="accent1"/>
-          </a:fillRef>
-          <a:effectRef idx="2">
-            <a:schemeClr val="accent1"/>
-          </a:effectRef>
-          <a:fontRef idx="minor">
-            <a:schemeClr val="lt1"/>
-          </a:fontRef>
-        </p:style>
-        <p:txBody>
-          <a:bodyPr rtlCol="0" anchor="ctr"/>
-          <a:lstStyle/>
-          <a:p>
-            <a:pPr algn="ctr"/>
-          </a:p>
-        </p:txBody>
-      </p:sp>
-      <p:sp>
-        <p:nvSpPr>
-          <p:cNvPr id="19" name="Oval 18"/>
-          <p:cNvSpPr/>
-          <p:nvPr/>
-        </p:nvSpPr>
-        <p:spPr>
-          <a:xfrm>
-            <a:off x="10149840" y="2560320"/>
-            <a:ext cx="731520" cy="731520"/>
+            <a:off x="10149840" y="2286000"/>
+            <a:ext cx="822960" cy="822960"/>
           </a:xfrm>
           <a:prstGeom prst="ellipse">
             <a:avLst/>
@@ -5819,14 +6081,14 @@
       </p:sp>
       <p:sp>
         <p:nvSpPr>
-          <p:cNvPr id="20" name="TextBox 19"/>
-          <p:cNvSpPr txBox="1"/>
-          <p:nvPr/>
-        </p:nvSpPr>
-        <p:spPr>
-          <a:xfrm>
-            <a:off x="10378440" y="2651760"/>
-            <a:ext cx="457200" cy="457200"/>
+          <p:cNvPr id="17" name="TextBox 16"/>
+          <p:cNvSpPr txBox="1"/>
+          <p:nvPr/>
+        </p:nvSpPr>
+        <p:spPr>
+          <a:xfrm>
+            <a:off x="10332719" y="2377440"/>
+            <a:ext cx="548640" cy="548640"/>
           </a:xfrm>
           <a:prstGeom prst="rect">
             <a:avLst/>
@@ -5840,7 +6102,7 @@
           <a:lstStyle/>
           <a:p>
             <a:pPr>
-              <a:defRPr sz="2400" b="1">
+              <a:defRPr sz="2800" b="1">
                 <a:solidFill>
                   <a:srgbClr val="FFFFFF"/>
                 </a:solidFill>
@@ -5855,14 +6117,14 @@
       </p:sp>
       <p:sp>
         <p:nvSpPr>
-          <p:cNvPr id="21" name="TextBox 20"/>
-          <p:cNvSpPr txBox="1"/>
-          <p:nvPr/>
-        </p:nvSpPr>
-        <p:spPr>
-          <a:xfrm>
-            <a:off x="9509760" y="3566160"/>
-            <a:ext cx="2011680" cy="457200"/>
+          <p:cNvPr id="18" name="TextBox 17"/>
+          <p:cNvSpPr txBox="1"/>
+          <p:nvPr/>
+        </p:nvSpPr>
+        <p:spPr>
+          <a:xfrm>
+            <a:off x="9235440" y="3474720"/>
+            <a:ext cx="2743200" cy="457200"/>
           </a:xfrm>
           <a:prstGeom prst="rect">
             <a:avLst/>
@@ -5878,7 +6140,7 @@
             <a:pPr algn="ctr">
               <a:defRPr sz="1800" b="1">
                 <a:solidFill>
-                  <a:srgbClr val="1A1A1A"/>
+                  <a:srgbClr val="FFFFFF"/>
                 </a:solidFill>
                 <a:latin typeface="Arial"/>
               </a:defRPr>
@@ -5891,14 +6153,14 @@
       </p:sp>
       <p:sp>
         <p:nvSpPr>
-          <p:cNvPr id="22" name="TextBox 21"/>
-          <p:cNvSpPr txBox="1"/>
-          <p:nvPr/>
-        </p:nvSpPr>
-        <p:spPr>
-          <a:xfrm>
-            <a:off x="9509760" y="4114800"/>
-            <a:ext cx="2011680" cy="914400"/>
+          <p:cNvPr id="19" name="TextBox 18"/>
+          <p:cNvSpPr txBox="1"/>
+          <p:nvPr/>
+        </p:nvSpPr>
+        <p:spPr>
+          <a:xfrm>
+            <a:off x="9235440" y="4023360"/>
+            <a:ext cx="2743200" cy="731520"/>
           </a:xfrm>
           <a:prstGeom prst="rect">
             <a:avLst/>
@@ -5912,19 +6174,15 @@
           <a:lstStyle/>
           <a:p>
             <a:pPr algn="ctr">
-              <a:defRPr sz="1200" b="0">
-                <a:solidFill>
-                  <a:srgbClr val="4A4A4A"/>
-                </a:solidFill>
-                <a:latin typeface="Arial"/>
-              </a:defRPr>
-            </a:pPr>
-            <a:r>
-              <a:t>Rehearse, feedback,</a:t>
-            </a:r>
-            <a:br/>
-            <a:r>
-              <a:t>improve</a:t>
+              <a:defRPr sz="1100" b="0">
+                <a:solidFill>
+                  <a:srgbClr val="A0A0A0"/>
+                </a:solidFill>
+                <a:latin typeface="Arial"/>
+              </a:defRPr>
+            </a:pPr>
+            <a:r>
+              <a:t>Rehearse, feedback, improve</a:t>
             </a:r>
           </a:p>
         </p:txBody>
@@ -5943,7 +6201,7 @@
     <p:bg>
       <p:bgPr>
         <a:solidFill>
-          <a:srgbClr val="C7F464"/>
+          <a:srgbClr val="1A1A1A"/>
         </a:solidFill>
         <a:effectLst/>
       </p:bgPr>
@@ -5963,8 +6221,8 @@
         </p:nvSpPr>
         <p:spPr>
           <a:xfrm>
-            <a:off x="914400" y="457200"/>
-            <a:ext cx="10058400" cy="731520"/>
+            <a:off x="731520" y="457200"/>
+            <a:ext cx="10058400" cy="640080"/>
           </a:xfrm>
           <a:prstGeom prst="rect">
             <a:avLst/>
@@ -5978,9 +6236,9 @@
           <a:lstStyle/>
           <a:p>
             <a:pPr>
-              <a:defRPr sz="3600" b="1">
-                <a:solidFill>
-                  <a:srgbClr val="1A1A1A"/>
+              <a:defRPr sz="3200" b="1">
+                <a:solidFill>
+                  <a:srgbClr val="FFFFFF"/>
                 </a:solidFill>
                 <a:latin typeface="Arial"/>
               </a:defRPr>
@@ -5999,8 +6257,8 @@
         </p:nvSpPr>
         <p:spPr>
           <a:xfrm>
-            <a:off x="914400" y="1097280"/>
-            <a:ext cx="10058400" cy="457200"/>
+            <a:off x="731520" y="1097280"/>
+            <a:ext cx="10058400" cy="365760"/>
           </a:xfrm>
           <a:prstGeom prst="rect">
             <a:avLst/>
@@ -6014,9 +6272,9 @@
           <a:lstStyle/>
           <a:p>
             <a:pPr>
-              <a:defRPr sz="1800" b="0">
-                <a:solidFill>
-                  <a:srgbClr val="4A4A4A"/>
+              <a:defRPr sz="1400" b="0">
+                <a:solidFill>
+                  <a:srgbClr val="A0A0A0"/>
                 </a:solidFill>
                 <a:latin typeface="Arial"/>
               </a:defRPr>
@@ -6035,14 +6293,14 @@
         </p:nvSpPr>
         <p:spPr>
           <a:xfrm>
-            <a:off x="914400" y="2011680"/>
-            <a:ext cx="5029200" cy="640080"/>
+            <a:off x="731520" y="2011680"/>
+            <a:ext cx="5303520" cy="640080"/>
           </a:xfrm>
           <a:prstGeom prst="roundRect">
             <a:avLst/>
           </a:prstGeom>
           <a:solidFill>
-            <a:srgbClr val="FFFFFF"/>
+            <a:srgbClr val="2A2A2A"/>
           </a:solidFill>
           <a:ln>
             <a:noFill/>
@@ -6078,8 +6336,8 @@
         </p:nvSpPr>
         <p:spPr>
           <a:xfrm>
-            <a:off x="1188720" y="2148840"/>
-            <a:ext cx="4572000" cy="457200"/>
+            <a:off x="1005840" y="2148840"/>
+            <a:ext cx="4754880" cy="457200"/>
           </a:xfrm>
           <a:prstGeom prst="rect">
             <a:avLst/>
@@ -6093,9 +6351,9 @@
           <a:lstStyle/>
           <a:p>
             <a:pPr>
-              <a:defRPr sz="1400" b="0">
-                <a:solidFill>
-                  <a:srgbClr val="1A1A1A"/>
+              <a:defRPr sz="1300" b="0">
+                <a:solidFill>
+                  <a:srgbClr val="FFFFFF"/>
                 </a:solidFill>
                 <a:latin typeface="Arial"/>
               </a:defRPr>
@@ -6115,13 +6373,13 @@
         <p:spPr>
           <a:xfrm>
             <a:off x="6217920" y="2011680"/>
-            <a:ext cx="5029200" cy="640080"/>
+            <a:ext cx="5303520" cy="640080"/>
           </a:xfrm>
           <a:prstGeom prst="roundRect">
             <a:avLst/>
           </a:prstGeom>
           <a:solidFill>
-            <a:srgbClr val="FFFFFF"/>
+            <a:srgbClr val="2A2A2A"/>
           </a:solidFill>
           <a:ln>
             <a:noFill/>
@@ -6158,7 +6416,7 @@
         <p:spPr>
           <a:xfrm>
             <a:off x="6492240" y="2148840"/>
-            <a:ext cx="4572000" cy="457200"/>
+            <a:ext cx="4754880" cy="457200"/>
           </a:xfrm>
           <a:prstGeom prst="rect">
             <a:avLst/>
@@ -6172,9 +6430,9 @@
           <a:lstStyle/>
           <a:p>
             <a:pPr>
-              <a:defRPr sz="1400" b="0">
-                <a:solidFill>
-                  <a:srgbClr val="1A1A1A"/>
+              <a:defRPr sz="1300" b="0">
+                <a:solidFill>
+                  <a:srgbClr val="FFFFFF"/>
                 </a:solidFill>
                 <a:latin typeface="Arial"/>
               </a:defRPr>
@@ -6193,14 +6451,14 @@
         </p:nvSpPr>
         <p:spPr>
           <a:xfrm>
-            <a:off x="914400" y="2926080"/>
-            <a:ext cx="5029200" cy="640080"/>
+            <a:off x="731520" y="2926080"/>
+            <a:ext cx="5303520" cy="640080"/>
           </a:xfrm>
           <a:prstGeom prst="roundRect">
             <a:avLst/>
           </a:prstGeom>
           <a:solidFill>
-            <a:srgbClr val="FFFFFF"/>
+            <a:srgbClr val="2A2A2A"/>
           </a:solidFill>
           <a:ln>
             <a:noFill/>
@@ -6236,8 +6494,8 @@
         </p:nvSpPr>
         <p:spPr>
           <a:xfrm>
-            <a:off x="1188720" y="3063240"/>
-            <a:ext cx="4572000" cy="457200"/>
+            <a:off x="1005840" y="3063240"/>
+            <a:ext cx="4754880" cy="457200"/>
           </a:xfrm>
           <a:prstGeom prst="rect">
             <a:avLst/>
@@ -6251,9 +6509,9 @@
           <a:lstStyle/>
           <a:p>
             <a:pPr>
-              <a:defRPr sz="1400" b="0">
-                <a:solidFill>
-                  <a:srgbClr val="1A1A1A"/>
+              <a:defRPr sz="1300" b="0">
+                <a:solidFill>
+                  <a:srgbClr val="FFFFFF"/>
                 </a:solidFill>
                 <a:latin typeface="Arial"/>
               </a:defRPr>
@@ -6273,13 +6531,13 @@
         <p:spPr>
           <a:xfrm>
             <a:off x="6217920" y="2926080"/>
-            <a:ext cx="5029200" cy="640080"/>
+            <a:ext cx="5303520" cy="640080"/>
           </a:xfrm>
           <a:prstGeom prst="roundRect">
             <a:avLst/>
           </a:prstGeom>
           <a:solidFill>
-            <a:srgbClr val="FFFFFF"/>
+            <a:srgbClr val="2A2A2A"/>
           </a:solidFill>
           <a:ln>
             <a:noFill/>
@@ -6316,7 +6574,7 @@
         <p:spPr>
           <a:xfrm>
             <a:off x="6492240" y="3063240"/>
-            <a:ext cx="4572000" cy="457200"/>
+            <a:ext cx="4754880" cy="457200"/>
           </a:xfrm>
           <a:prstGeom prst="rect">
             <a:avLst/>
@@ -6330,9 +6588,9 @@
           <a:lstStyle/>
           <a:p>
             <a:pPr>
-              <a:defRPr sz="1400" b="0">
-                <a:solidFill>
-                  <a:srgbClr val="1A1A1A"/>
+              <a:defRPr sz="1300" b="0">
+                <a:solidFill>
+                  <a:srgbClr val="FFFFFF"/>
                 </a:solidFill>
                 <a:latin typeface="Arial"/>
               </a:defRPr>
@@ -6351,14 +6609,14 @@
         </p:nvSpPr>
         <p:spPr>
           <a:xfrm>
-            <a:off x="914400" y="3840480"/>
-            <a:ext cx="5029200" cy="640080"/>
+            <a:off x="731520" y="3840480"/>
+            <a:ext cx="5303520" cy="640080"/>
           </a:xfrm>
           <a:prstGeom prst="roundRect">
             <a:avLst/>
           </a:prstGeom>
           <a:solidFill>
-            <a:srgbClr val="FFFFFF"/>
+            <a:srgbClr val="2A2A2A"/>
           </a:solidFill>
           <a:ln>
             <a:noFill/>
@@ -6394,8 +6652,8 @@
         </p:nvSpPr>
         <p:spPr>
           <a:xfrm>
-            <a:off x="1188720" y="3977640"/>
-            <a:ext cx="4572000" cy="457200"/>
+            <a:off x="1005840" y="3977640"/>
+            <a:ext cx="4754880" cy="457200"/>
           </a:xfrm>
           <a:prstGeom prst="rect">
             <a:avLst/>
@@ -6409,9 +6667,9 @@
           <a:lstStyle/>
           <a:p>
             <a:pPr>
-              <a:defRPr sz="1400" b="0">
-                <a:solidFill>
-                  <a:srgbClr val="1A1A1A"/>
+              <a:defRPr sz="1300" b="0">
+                <a:solidFill>
+                  <a:srgbClr val="FFFFFF"/>
                 </a:solidFill>
                 <a:latin typeface="Arial"/>
               </a:defRPr>
@@ -6431,13 +6689,13 @@
         <p:spPr>
           <a:xfrm>
             <a:off x="6217920" y="3840480"/>
-            <a:ext cx="5029200" cy="640080"/>
+            <a:ext cx="5303520" cy="640080"/>
           </a:xfrm>
           <a:prstGeom prst="roundRect">
             <a:avLst/>
           </a:prstGeom>
           <a:solidFill>
-            <a:srgbClr val="FFFFFF"/>
+            <a:srgbClr val="2A2A2A"/>
           </a:solidFill>
           <a:ln>
             <a:noFill/>
@@ -6474,7 +6732,7 @@
         <p:spPr>
           <a:xfrm>
             <a:off x="6492240" y="3977640"/>
-            <a:ext cx="4572000" cy="457200"/>
+            <a:ext cx="4754880" cy="457200"/>
           </a:xfrm>
           <a:prstGeom prst="rect">
             <a:avLst/>
@@ -6488,9 +6746,9 @@
           <a:lstStyle/>
           <a:p>
             <a:pPr>
-              <a:defRPr sz="1400" b="0">
-                <a:solidFill>
-                  <a:srgbClr val="1A1A1A"/>
+              <a:defRPr sz="1300" b="0">
+                <a:solidFill>
+                  <a:srgbClr val="FFFFFF"/>
                 </a:solidFill>
                 <a:latin typeface="Arial"/>
               </a:defRPr>
@@ -6515,7 +6773,7 @@
     <p:bg>
       <p:bgPr>
         <a:solidFill>
-          <a:srgbClr val="C7F464"/>
+          <a:srgbClr val="1A1A1A"/>
         </a:solidFill>
         <a:effectLst/>
       </p:bgPr>
@@ -6535,7 +6793,7 @@
         </p:nvSpPr>
         <p:spPr>
           <a:xfrm>
-            <a:off x="914400" y="274320"/>
+            <a:off x="731520" y="274320"/>
             <a:ext cx="10058400" cy="548640"/>
           </a:xfrm>
           <a:prstGeom prst="rect">
@@ -6550,9 +6808,9 @@
           <a:lstStyle/>
           <a:p>
             <a:pPr>
-              <a:defRPr sz="3200" b="1">
-                <a:solidFill>
-                  <a:srgbClr val="1A1A1A"/>
+              <a:defRPr sz="2800" b="1">
+                <a:solidFill>
+                  <a:srgbClr val="FFFFFF"/>
                 </a:solidFill>
                 <a:latin typeface="Arial"/>
               </a:defRPr>
@@ -6571,14 +6829,14 @@
         </p:nvSpPr>
         <p:spPr>
           <a:xfrm>
-            <a:off x="731520" y="1097280"/>
-            <a:ext cx="3474720" cy="4572000"/>
+            <a:off x="731520" y="1188720"/>
+            <a:ext cx="3474720" cy="4754880"/>
           </a:xfrm>
           <a:prstGeom prst="roundRect">
             <a:avLst/>
           </a:prstGeom>
           <a:solidFill>
-            <a:srgbClr val="FFFFFF"/>
+            <a:srgbClr val="2A2A2A"/>
           </a:solidFill>
           <a:ln>
             <a:noFill/>
@@ -6614,8 +6872,8 @@
         </p:nvSpPr>
         <p:spPr>
           <a:xfrm>
-            <a:off x="914400" y="1280160"/>
-            <a:ext cx="3200400" cy="365760"/>
+            <a:off x="914400" y="1371600"/>
+            <a:ext cx="3108960" cy="365760"/>
           </a:xfrm>
           <a:prstGeom prst="rect">
             <a:avLst/>
@@ -6629,9 +6887,9 @@
           <a:lstStyle/>
           <a:p>
             <a:pPr algn="ctr">
-              <a:defRPr sz="1200" b="1">
-                <a:solidFill>
-                  <a:srgbClr val="0D6B56"/>
+              <a:defRPr sz="1100" b="1">
+                <a:solidFill>
+                  <a:srgbClr val="10A37F"/>
                 </a:solidFill>
                 <a:latin typeface="Arial"/>
               </a:defRPr>
@@ -6650,8 +6908,8 @@
         </p:nvSpPr>
         <p:spPr>
           <a:xfrm>
-            <a:off x="914400" y="1737360"/>
-            <a:ext cx="3200400" cy="548640"/>
+            <a:off x="914400" y="1828800"/>
+            <a:ext cx="3108960" cy="640080"/>
           </a:xfrm>
           <a:prstGeom prst="rect">
             <a:avLst/>
@@ -6667,7 +6925,7 @@
             <a:pPr algn="ctr">
               <a:defRPr sz="4000" b="1">
                 <a:solidFill>
-                  <a:srgbClr val="1A1A1A"/>
+                  <a:srgbClr val="FFFFFF"/>
                 </a:solidFill>
                 <a:latin typeface="Arial"/>
               </a:defRPr>
@@ -6686,8 +6944,8 @@
         </p:nvSpPr>
         <p:spPr>
           <a:xfrm>
-            <a:off x="914400" y="2286000"/>
-            <a:ext cx="3200400" cy="274320"/>
+            <a:off x="914400" y="2468880"/>
+            <a:ext cx="3108960" cy="274320"/>
           </a:xfrm>
           <a:prstGeom prst="rect">
             <a:avLst/>
@@ -6701,9 +6959,9 @@
           <a:lstStyle/>
           <a:p>
             <a:pPr algn="ctr">
-              <a:defRPr sz="1200" b="0">
-                <a:solidFill>
-                  <a:srgbClr val="4A4A4A"/>
+              <a:defRPr sz="1100" b="0">
+                <a:solidFill>
+                  <a:srgbClr val="A0A0A0"/>
                 </a:solidFill>
                 <a:latin typeface="Arial"/>
               </a:defRPr>
@@ -6722,7 +6980,7 @@
         </p:nvSpPr>
         <p:spPr>
           <a:xfrm>
-            <a:off x="1097280" y="2926080"/>
+            <a:off x="1097280" y="3017520"/>
             <a:ext cx="2926080" cy="2286000"/>
           </a:xfrm>
           <a:prstGeom prst="rect">
@@ -6737,9 +6995,9 @@
           <a:lstStyle/>
           <a:p>
             <a:pPr>
-              <a:defRPr sz="1100" b="0">
-                <a:solidFill>
-                  <a:srgbClr val="4A4A4A"/>
+              <a:defRPr sz="1000" b="0">
+                <a:solidFill>
+                  <a:srgbClr val="A0A0A0"/>
                 </a:solidFill>
                 <a:latin typeface="Arial"/>
               </a:defRPr>
@@ -6774,14 +7032,14 @@
         </p:nvSpPr>
         <p:spPr>
           <a:xfrm>
-            <a:off x="4389120" y="1097280"/>
-            <a:ext cx="3474720" cy="4572000"/>
+            <a:off x="4389120" y="1188720"/>
+            <a:ext cx="3474720" cy="4754880"/>
           </a:xfrm>
           <a:prstGeom prst="roundRect">
             <a:avLst/>
           </a:prstGeom>
           <a:solidFill>
-            <a:srgbClr val="FFFFFF"/>
+            <a:srgbClr val="2A2A2A"/>
           </a:solidFill>
           <a:ln w="25400">
             <a:solidFill>
@@ -6819,8 +7077,8 @@
         </p:nvSpPr>
         <p:spPr>
           <a:xfrm>
-            <a:off x="5029200" y="914400"/>
-            <a:ext cx="2286000" cy="274320"/>
+            <a:off x="5303520" y="1005840"/>
+            <a:ext cx="1645920" cy="274320"/>
           </a:xfrm>
           <a:prstGeom prst="rect">
             <a:avLst/>
@@ -6834,9 +7092,9 @@
           <a:lstStyle/>
           <a:p>
             <a:pPr algn="ctr">
-              <a:defRPr sz="1000" b="1">
-                <a:solidFill>
-                  <a:srgbClr val="0D6B56"/>
+              <a:defRPr sz="900" b="1">
+                <a:solidFill>
+                  <a:srgbClr val="10A37F"/>
                 </a:solidFill>
                 <a:latin typeface="Arial"/>
               </a:defRPr>
@@ -6855,8 +7113,8 @@
         </p:nvSpPr>
         <p:spPr>
           <a:xfrm>
-            <a:off x="4572000" y="1280160"/>
-            <a:ext cx="3200400" cy="365760"/>
+            <a:off x="4572000" y="1371600"/>
+            <a:ext cx="3108960" cy="365760"/>
           </a:xfrm>
           <a:prstGeom prst="rect">
             <a:avLst/>
@@ -6870,9 +7128,9 @@
           <a:lstStyle/>
           <a:p>
             <a:pPr algn="ctr">
-              <a:defRPr sz="1200" b="1">
-                <a:solidFill>
-                  <a:srgbClr val="0D6B56"/>
+              <a:defRPr sz="1100" b="1">
+                <a:solidFill>
+                  <a:srgbClr val="10A37F"/>
                 </a:solidFill>
                 <a:latin typeface="Arial"/>
               </a:defRPr>
@@ -6891,8 +7149,8 @@
         </p:nvSpPr>
         <p:spPr>
           <a:xfrm>
-            <a:off x="4572000" y="1737360"/>
-            <a:ext cx="3200400" cy="548640"/>
+            <a:off x="4572000" y="1828800"/>
+            <a:ext cx="3108960" cy="640080"/>
           </a:xfrm>
           <a:prstGeom prst="rect">
             <a:avLst/>
@@ -6908,7 +7166,7 @@
             <a:pPr algn="ctr">
               <a:defRPr sz="4000" b="1">
                 <a:solidFill>
-                  <a:srgbClr val="1A1A1A"/>
+                  <a:srgbClr val="FFFFFF"/>
                 </a:solidFill>
                 <a:latin typeface="Arial"/>
               </a:defRPr>
@@ -6927,8 +7185,8 @@
         </p:nvSpPr>
         <p:spPr>
           <a:xfrm>
-            <a:off x="4572000" y="2286000"/>
-            <a:ext cx="3200400" cy="274320"/>
+            <a:off x="4572000" y="2468880"/>
+            <a:ext cx="3108960" cy="274320"/>
           </a:xfrm>
           <a:prstGeom prst="rect">
             <a:avLst/>
@@ -6942,9 +7200,9 @@
           <a:lstStyle/>
           <a:p>
             <a:pPr algn="ctr">
-              <a:defRPr sz="1200" b="0">
-                <a:solidFill>
-                  <a:srgbClr val="4A4A4A"/>
+              <a:defRPr sz="1100" b="0">
+                <a:solidFill>
+                  <a:srgbClr val="A0A0A0"/>
                 </a:solidFill>
                 <a:latin typeface="Arial"/>
               </a:defRPr>
@@ -6963,7 +7221,7 @@
         </p:nvSpPr>
         <p:spPr>
           <a:xfrm>
-            <a:off x="4754880" y="2926080"/>
+            <a:off x="4754880" y="3017520"/>
             <a:ext cx="2926080" cy="2286000"/>
           </a:xfrm>
           <a:prstGeom prst="rect">
@@ -6978,9 +7236,9 @@
           <a:lstStyle/>
           <a:p>
             <a:pPr>
-              <a:defRPr sz="1100" b="0">
-                <a:solidFill>
-                  <a:srgbClr val="4A4A4A"/>
+              <a:defRPr sz="1000" b="0">
+                <a:solidFill>
+                  <a:srgbClr val="A0A0A0"/>
                 </a:solidFill>
                 <a:latin typeface="Arial"/>
               </a:defRPr>
@@ -6994,11 +7252,11 @@
             </a:r>
             <a:br/>
             <a:r>
-              <a:t>✓ Team analytics</a:t>
+              <a:t>✓ Team analytics + gamification</a:t>
             </a:r>
             <a:br/>
             <a:r>
-              <a:t>✓ Gamification</a:t>
+              <a:t>✓ Pooled Content Studio</a:t>
             </a:r>
             <a:br/>
             <a:r>
@@ -7015,14 +7273,14 @@
         </p:nvSpPr>
         <p:spPr>
           <a:xfrm>
-            <a:off x="8046720" y="1097280"/>
-            <a:ext cx="3474720" cy="4572000"/>
+            <a:off x="8046720" y="1188720"/>
+            <a:ext cx="3474720" cy="4754880"/>
           </a:xfrm>
           <a:prstGeom prst="roundRect">
             <a:avLst/>
           </a:prstGeom>
           <a:solidFill>
-            <a:srgbClr val="FFFFFF"/>
+            <a:srgbClr val="2A2A2A"/>
           </a:solidFill>
           <a:ln>
             <a:noFill/>
@@ -7058,8 +7316,8 @@
         </p:nvSpPr>
         <p:spPr>
           <a:xfrm>
-            <a:off x="8229600" y="1280160"/>
-            <a:ext cx="3200400" cy="365760"/>
+            <a:off x="8229600" y="1371600"/>
+            <a:ext cx="3108960" cy="365760"/>
           </a:xfrm>
           <a:prstGeom prst="rect">
             <a:avLst/>
@@ -7073,9 +7331,9 @@
           <a:lstStyle/>
           <a:p>
             <a:pPr algn="ctr">
-              <a:defRPr sz="1200" b="1">
-                <a:solidFill>
-                  <a:srgbClr val="0D6B56"/>
+              <a:defRPr sz="1100" b="1">
+                <a:solidFill>
+                  <a:srgbClr val="10A37F"/>
                 </a:solidFill>
                 <a:latin typeface="Arial"/>
               </a:defRPr>
@@ -7094,8 +7352,8 @@
         </p:nvSpPr>
         <p:spPr>
           <a:xfrm>
-            <a:off x="8229600" y="1737360"/>
-            <a:ext cx="3200400" cy="548640"/>
+            <a:off x="8229600" y="1828800"/>
+            <a:ext cx="3108960" cy="640080"/>
           </a:xfrm>
           <a:prstGeom prst="rect">
             <a:avLst/>
@@ -7111,7 +7369,7 @@
             <a:pPr algn="ctr">
               <a:defRPr sz="4000" b="1">
                 <a:solidFill>
-                  <a:srgbClr val="1A1A1A"/>
+                  <a:srgbClr val="FFFFFF"/>
                 </a:solidFill>
                 <a:latin typeface="Arial"/>
               </a:defRPr>
@@ -7130,8 +7388,8 @@
         </p:nvSpPr>
         <p:spPr>
           <a:xfrm>
-            <a:off x="8229600" y="2286000"/>
-            <a:ext cx="3200400" cy="274320"/>
+            <a:off x="8229600" y="2468880"/>
+            <a:ext cx="3108960" cy="274320"/>
           </a:xfrm>
           <a:prstGeom prst="rect">
             <a:avLst/>
@@ -7145,9 +7403,9 @@
           <a:lstStyle/>
           <a:p>
             <a:pPr algn="ctr">
-              <a:defRPr sz="1200" b="0">
-                <a:solidFill>
-                  <a:srgbClr val="4A4A4A"/>
+              <a:defRPr sz="1100" b="0">
+                <a:solidFill>
+                  <a:srgbClr val="A0A0A0"/>
                 </a:solidFill>
                 <a:latin typeface="Arial"/>
               </a:defRPr>
@@ -7166,7 +7424,7 @@
         </p:nvSpPr>
         <p:spPr>
           <a:xfrm>
-            <a:off x="8412480" y="2926080"/>
+            <a:off x="8412480" y="3017520"/>
             <a:ext cx="2926080" cy="2286000"/>
           </a:xfrm>
           <a:prstGeom prst="rect">
@@ -7181,9 +7439,9 @@
           <a:lstStyle/>
           <a:p>
             <a:pPr>
-              <a:defRPr sz="1100" b="0">
-                <a:solidFill>
-                  <a:srgbClr val="4A4A4A"/>
+              <a:defRPr sz="1000" b="0">
+                <a:solidFill>
+                  <a:srgbClr val="A0A0A0"/>
                 </a:solidFill>
                 <a:latin typeface="Arial"/>
               </a:defRPr>
@@ -7224,7 +7482,7 @@
     <p:bg>
       <p:bgPr>
         <a:solidFill>
-          <a:srgbClr val="C7F464"/>
+          <a:srgbClr val="1A1A1A"/>
         </a:solidFill>
         <a:effectLst/>
       </p:bgPr>
@@ -7244,7 +7502,7 @@
         </p:nvSpPr>
         <p:spPr>
           <a:xfrm>
-            <a:off x="0" y="1371600"/>
+            <a:off x="0" y="1645920"/>
             <a:ext cx="12191695" cy="731520"/>
           </a:xfrm>
           <a:prstGeom prst="rect">
@@ -7261,7 +7519,7 @@
             <a:pPr algn="ctr">
               <a:defRPr sz="4800" b="1">
                 <a:solidFill>
-                  <a:srgbClr val="0D6B56"/>
+                  <a:srgbClr val="10A37F"/>
                 </a:solidFill>
                 <a:latin typeface="Arial"/>
               </a:defRPr>
@@ -7280,7 +7538,7 @@
         </p:nvSpPr>
         <p:spPr>
           <a:xfrm>
-            <a:off x="0" y="2560320"/>
+            <a:off x="0" y="2743200"/>
             <a:ext cx="12191695" cy="1097280"/>
           </a:xfrm>
           <a:prstGeom prst="rect">
@@ -7295,9 +7553,9 @@
           <a:lstStyle/>
           <a:p>
             <a:pPr algn="ctr">
-              <a:defRPr sz="4000" b="1">
-                <a:solidFill>
-                  <a:srgbClr val="1A1A1A"/>
+              <a:defRPr sz="3600" b="1">
+                <a:solidFill>
+                  <a:srgbClr val="FFFFFF"/>
                 </a:solidFill>
                 <a:latin typeface="Arial"/>
               </a:defRPr>
@@ -7320,8 +7578,8 @@
         </p:nvSpPr>
         <p:spPr>
           <a:xfrm>
-            <a:off x="0" y="4114800"/>
-            <a:ext cx="12191695" cy="548640"/>
+            <a:off x="0" y="4389120"/>
+            <a:ext cx="12191695" cy="457200"/>
           </a:xfrm>
           <a:prstGeom prst="rect">
             <a:avLst/>
@@ -7335,9 +7593,9 @@
           <a:lstStyle/>
           <a:p>
             <a:pPr algn="ctr">
-              <a:defRPr sz="1800" b="0">
-                <a:solidFill>
-                  <a:srgbClr val="4A4A4A"/>
+              <a:defRPr sz="1600" b="0">
+                <a:solidFill>
+                  <a:srgbClr val="A0A0A0"/>
                 </a:solidFill>
                 <a:latin typeface="Arial"/>
               </a:defRPr>
@@ -7356,7 +7614,7 @@
         </p:nvSpPr>
         <p:spPr>
           <a:xfrm>
-            <a:off x="4389120" y="4846320"/>
+            <a:off x="4389120" y="5029200"/>
             <a:ext cx="3383280" cy="640080"/>
           </a:xfrm>
           <a:prstGeom prst="roundRect">
@@ -7399,7 +7657,7 @@
         </p:nvSpPr>
         <p:spPr>
           <a:xfrm>
-            <a:off x="4846320" y="4937760"/>
+            <a:off x="4846320" y="5120640"/>
             <a:ext cx="2560320" cy="457200"/>
           </a:xfrm>
           <a:prstGeom prst="rect">
@@ -7414,7 +7672,7 @@
           <a:lstStyle/>
           <a:p>
             <a:pPr algn="ctr">
-              <a:defRPr sz="1800" b="1">
+              <a:defRPr sz="1600" b="1">
                 <a:solidFill>
                   <a:srgbClr val="FFFFFF"/>
                 </a:solidFill>
@@ -7435,7 +7693,7 @@
         </p:nvSpPr>
         <p:spPr>
           <a:xfrm>
-            <a:off x="0" y="5760720"/>
+            <a:off x="0" y="5943600"/>
             <a:ext cx="12191695" cy="365760"/>
           </a:xfrm>
           <a:prstGeom prst="rect">
@@ -7450,9 +7708,9 @@
           <a:lstStyle/>
           <a:p>
             <a:pPr algn="ctr">
-              <a:defRPr sz="1400" b="0">
-                <a:solidFill>
-                  <a:srgbClr val="4A4A4A"/>
+              <a:defRPr sz="1200" b="0">
+                <a:solidFill>
+                  <a:srgbClr val="A0A0A0"/>
                 </a:solidFill>
                 <a:latin typeface="Arial"/>
               </a:defRPr>

</xml_diff>